<commit_message>
Upload of edited Presentation Slides
</commit_message>
<xml_diff>
--- a/The Knicks Java Final Project Presentation.pptx
+++ b/The Knicks Java Final Project Presentation.pptx
@@ -13171,37 +13171,9 @@
           </a:p>
         </p:txBody>
       </p:sp>
-      <p:pic>
-        <p:nvPicPr>
-          <p:cNvPr id="232" name="Google Shape;232;p27"/>
-          <p:cNvPicPr preferRelativeResize="0"/>
-          <p:nvPr/>
-        </p:nvPicPr>
-        <p:blipFill>
-          <a:blip r:embed="rId3">
-            <a:alphaModFix/>
-          </a:blip>
-          <a:stretch>
-            <a:fillRect/>
-          </a:stretch>
-        </p:blipFill>
-        <p:spPr>
-          <a:xfrm>
-            <a:off x="4349375" y="1307850"/>
-            <a:ext cx="4150726" cy="3045674"/>
-          </a:xfrm>
-          <a:prstGeom prst="rect">
-            <a:avLst/>
-          </a:prstGeom>
-          <a:noFill/>
-          <a:ln>
-            <a:noFill/>
-          </a:ln>
-        </p:spPr>
-      </p:pic>
       <p:sp>
         <p:nvSpPr>
-          <p:cNvPr id="233" name="Google Shape;233;p27"/>
+          <p:cNvPr id="232" name="Google Shape;232;p27"/>
           <p:cNvSpPr txBox="1"/>
           <p:nvPr/>
         </p:nvSpPr>
@@ -13250,7 +13222,7 @@
       </p:sp>
       <p:sp>
         <p:nvSpPr>
-          <p:cNvPr id="234" name="Google Shape;234;p27"/>
+          <p:cNvPr id="233" name="Google Shape;233;p27"/>
           <p:cNvSpPr txBox="1"/>
           <p:nvPr/>
         </p:nvSpPr>
@@ -13309,6 +13281,34 @@
           </a:p>
         </p:txBody>
       </p:sp>
+      <p:pic>
+        <p:nvPicPr>
+          <p:cNvPr id="234" name="Google Shape;234;p27"/>
+          <p:cNvPicPr preferRelativeResize="0"/>
+          <p:nvPr/>
+        </p:nvPicPr>
+        <p:blipFill>
+          <a:blip r:embed="rId3">
+            <a:alphaModFix/>
+          </a:blip>
+          <a:stretch>
+            <a:fillRect/>
+          </a:stretch>
+        </p:blipFill>
+        <p:spPr>
+          <a:xfrm>
+            <a:off x="4614125" y="1131700"/>
+            <a:ext cx="4042798" cy="2880099"/>
+          </a:xfrm>
+          <a:prstGeom prst="rect">
+            <a:avLst/>
+          </a:prstGeom>
+          <a:noFill/>
+          <a:ln>
+            <a:noFill/>
+          </a:ln>
+        </p:spPr>
+      </p:pic>
     </p:spTree>
   </p:cSld>
   <p:clrMapOvr>
@@ -16840,37 +16840,9 @@
           </a:p>
         </p:txBody>
       </p:sp>
-      <p:pic>
-        <p:nvPicPr>
-          <p:cNvPr id="188" name="Google Shape;188;p21"/>
-          <p:cNvPicPr preferRelativeResize="0"/>
-          <p:nvPr/>
-        </p:nvPicPr>
-        <p:blipFill>
-          <a:blip r:embed="rId3">
-            <a:alphaModFix/>
-          </a:blip>
-          <a:stretch>
-            <a:fillRect/>
-          </a:stretch>
-        </p:blipFill>
-        <p:spPr>
-          <a:xfrm>
-            <a:off x="4498650" y="1156675"/>
-            <a:ext cx="3986100" cy="3604099"/>
-          </a:xfrm>
-          <a:prstGeom prst="rect">
-            <a:avLst/>
-          </a:prstGeom>
-          <a:noFill/>
-          <a:ln>
-            <a:noFill/>
-          </a:ln>
-        </p:spPr>
-      </p:pic>
       <p:sp>
         <p:nvSpPr>
-          <p:cNvPr id="189" name="Google Shape;189;p21"/>
+          <p:cNvPr id="188" name="Google Shape;188;p21"/>
           <p:cNvSpPr txBox="1"/>
           <p:nvPr/>
         </p:nvSpPr>
@@ -16929,6 +16901,34 @@
           </a:p>
         </p:txBody>
       </p:sp>
+      <p:pic>
+        <p:nvPicPr>
+          <p:cNvPr id="189" name="Google Shape;189;p21"/>
+          <p:cNvPicPr preferRelativeResize="0"/>
+          <p:nvPr/>
+        </p:nvPicPr>
+        <p:blipFill>
+          <a:blip r:embed="rId3">
+            <a:alphaModFix/>
+          </a:blip>
+          <a:stretch>
+            <a:fillRect/>
+          </a:stretch>
+        </p:blipFill>
+        <p:spPr>
+          <a:xfrm>
+            <a:off x="4365575" y="863138"/>
+            <a:ext cx="4641376" cy="3417213"/>
+          </a:xfrm>
+          <a:prstGeom prst="rect">
+            <a:avLst/>
+          </a:prstGeom>
+          <a:noFill/>
+          <a:ln>
+            <a:noFill/>
+          </a:ln>
+        </p:spPr>
+      </p:pic>
     </p:spTree>
   </p:cSld>
   <p:clrMapOvr>

</xml_diff>

<commit_message>
Removed duplicate slide in presentation
</commit_message>
<xml_diff>
--- a/The Knicks Java Final Project Presentation.pptx
+++ b/The Knicks Java Final Project Presentation.pptx
@@ -38,24 +38,23 @@
     <p:sldId id="283" r:id="rId33"/>
     <p:sldId id="284" r:id="rId34"/>
     <p:sldId id="285" r:id="rId35"/>
-    <p:sldId id="286" r:id="rId36"/>
   </p:sldIdLst>
   <p:sldSz cy="5143500" cx="9144000"/>
   <p:notesSz cx="6858000" cy="9144000"/>
   <p:embeddedFontLst>
     <p:embeddedFont>
       <p:font typeface="Montserrat"/>
-      <p:regular r:id="rId37"/>
-      <p:bold r:id="rId38"/>
-      <p:italic r:id="rId39"/>
-      <p:boldItalic r:id="rId40"/>
+      <p:regular r:id="rId36"/>
+      <p:bold r:id="rId37"/>
+      <p:italic r:id="rId38"/>
+      <p:boldItalic r:id="rId39"/>
     </p:embeddedFont>
     <p:embeddedFont>
       <p:font typeface="Lato"/>
-      <p:regular r:id="rId41"/>
-      <p:bold r:id="rId42"/>
-      <p:italic r:id="rId43"/>
-      <p:boldItalic r:id="rId44"/>
+      <p:regular r:id="rId40"/>
+      <p:bold r:id="rId41"/>
+      <p:italic r:id="rId42"/>
+      <p:boldItalic r:id="rId43"/>
     </p:embeddedFont>
   </p:embeddedFontLst>
   <p:defaultTextStyle>
@@ -1741,7 +1740,7 @@
       </p:grpSpPr>
       <p:sp>
         <p:nvSpPr>
-          <p:cNvPr id="273" name="Google Shape;273;gcd8045d72a_1_27:notes"/>
+          <p:cNvPr id="273" name="Google Shape;273;gcd8045d72a_1_66:notes"/>
           <p:cNvSpPr/>
           <p:nvPr>
             <p:ph idx="2" type="sldImg"/>
@@ -1776,7 +1775,7 @@
       </p:sp>
       <p:sp>
         <p:nvSpPr>
-          <p:cNvPr id="274" name="Google Shape;274;gcd8045d72a_1_27:notes"/>
+          <p:cNvPr id="274" name="Google Shape;274;gcd8045d72a_1_66:notes"/>
           <p:cNvSpPr txBox="1"/>
           <p:nvPr>
             <p:ph idx="1" type="body"/>
@@ -1925,7 +1924,7 @@
   <p:cSld>
     <p:spTree>
       <p:nvGrpSpPr>
-        <p:cNvPr id="280" name="Shape 280"/>
+        <p:cNvPr id="281" name="Shape 281"/>
         <p:cNvGrpSpPr/>
         <p:nvPr/>
       </p:nvGrpSpPr>
@@ -1939,7 +1938,7 @@
       </p:grpSpPr>
       <p:sp>
         <p:nvSpPr>
-          <p:cNvPr id="281" name="Google Shape;281;gd425a55f0b_0_1289:notes"/>
+          <p:cNvPr id="282" name="Google Shape;282;gd425a55f0b_0_1289:notes"/>
           <p:cNvSpPr/>
           <p:nvPr>
             <p:ph idx="2" type="sldImg"/>
@@ -1974,7 +1973,7 @@
       </p:sp>
       <p:sp>
         <p:nvSpPr>
-          <p:cNvPr id="282" name="Google Shape;282;gd425a55f0b_0_1289:notes"/>
+          <p:cNvPr id="283" name="Google Shape;283;gd425a55f0b_0_1289:notes"/>
           <p:cNvSpPr txBox="1"/>
           <p:nvPr>
             <p:ph idx="1" type="body"/>
@@ -2024,7 +2023,7 @@
   <p:cSld>
     <p:spTree>
       <p:nvGrpSpPr>
-        <p:cNvPr id="288" name="Shape 288"/>
+        <p:cNvPr id="289" name="Shape 289"/>
         <p:cNvGrpSpPr/>
         <p:nvPr/>
       </p:nvGrpSpPr>
@@ -2038,7 +2037,7 @@
       </p:grpSpPr>
       <p:sp>
         <p:nvSpPr>
-          <p:cNvPr id="289" name="Google Shape;289;gcd8045d72a_1_66:notes"/>
+          <p:cNvPr id="290" name="Google Shape;290;gcd8045d72a_1_75:notes"/>
           <p:cNvSpPr/>
           <p:nvPr>
             <p:ph idx="2" type="sldImg"/>
@@ -2073,7 +2072,7 @@
       </p:sp>
       <p:sp>
         <p:nvSpPr>
-          <p:cNvPr id="290" name="Google Shape;290;gcd8045d72a_1_66:notes"/>
+          <p:cNvPr id="291" name="Google Shape;291;gcd8045d72a_1_75:notes"/>
           <p:cNvSpPr txBox="1"/>
           <p:nvPr>
             <p:ph idx="1" type="body"/>
@@ -2137,7 +2136,7 @@
       </p:grpSpPr>
       <p:sp>
         <p:nvSpPr>
-          <p:cNvPr id="298" name="Google Shape;298;gcd8045d72a_1_75:notes"/>
+          <p:cNvPr id="298" name="Google Shape;298;gd04c478625_0_0:notes"/>
           <p:cNvSpPr/>
           <p:nvPr>
             <p:ph idx="2" type="sldImg"/>
@@ -2172,7 +2171,7 @@
       </p:sp>
       <p:sp>
         <p:nvSpPr>
-          <p:cNvPr id="299" name="Google Shape;299;gcd8045d72a_1_75:notes"/>
+          <p:cNvPr id="299" name="Google Shape;299;gd04c478625_0_0:notes"/>
           <p:cNvSpPr txBox="1"/>
           <p:nvPr>
             <p:ph idx="1" type="body"/>
@@ -2236,7 +2235,7 @@
       </p:grpSpPr>
       <p:sp>
         <p:nvSpPr>
-          <p:cNvPr id="306" name="Google Shape;306;gd04c478625_0_0:notes"/>
+          <p:cNvPr id="306" name="Google Shape;306;gcd8045d72a_2_12:notes"/>
           <p:cNvSpPr/>
           <p:nvPr>
             <p:ph idx="2" type="sldImg"/>
@@ -2271,7 +2270,7 @@
       </p:sp>
       <p:sp>
         <p:nvSpPr>
-          <p:cNvPr id="307" name="Google Shape;307;gd04c478625_0_0:notes"/>
+          <p:cNvPr id="307" name="Google Shape;307;gcd8045d72a_2_12:notes"/>
           <p:cNvSpPr txBox="1"/>
           <p:nvPr>
             <p:ph idx="1" type="body"/>
@@ -2335,7 +2334,7 @@
       </p:grpSpPr>
       <p:sp>
         <p:nvSpPr>
-          <p:cNvPr id="314" name="Google Shape;314;gcd8045d72a_2_12:notes"/>
+          <p:cNvPr id="314" name="Google Shape;314;gd04c478625_0_5:notes"/>
           <p:cNvSpPr/>
           <p:nvPr>
             <p:ph idx="2" type="sldImg"/>
@@ -2370,7 +2369,7 @@
       </p:sp>
       <p:sp>
         <p:nvSpPr>
-          <p:cNvPr id="315" name="Google Shape;315;gcd8045d72a_2_12:notes"/>
+          <p:cNvPr id="315" name="Google Shape;315;gd04c478625_0_5:notes"/>
           <p:cNvSpPr txBox="1"/>
           <p:nvPr>
             <p:ph idx="1" type="body"/>
@@ -2420,7 +2419,7 @@
   <p:cSld>
     <p:spTree>
       <p:nvGrpSpPr>
-        <p:cNvPr id="321" name="Shape 321"/>
+        <p:cNvPr id="320" name="Shape 320"/>
         <p:cNvGrpSpPr/>
         <p:nvPr/>
       </p:nvGrpSpPr>
@@ -2434,7 +2433,7 @@
       </p:grpSpPr>
       <p:sp>
         <p:nvSpPr>
-          <p:cNvPr id="322" name="Google Shape;322;gd04c478625_0_5:notes"/>
+          <p:cNvPr id="321" name="Google Shape;321;gd04c478625_0_15:notes"/>
           <p:cNvSpPr/>
           <p:nvPr>
             <p:ph idx="2" type="sldImg"/>
@@ -2469,7 +2468,7 @@
       </p:sp>
       <p:sp>
         <p:nvSpPr>
-          <p:cNvPr id="323" name="Google Shape;323;gd04c478625_0_5:notes"/>
+          <p:cNvPr id="322" name="Google Shape;322;gd04c478625_0_15:notes"/>
           <p:cNvSpPr txBox="1"/>
           <p:nvPr>
             <p:ph idx="1" type="body"/>
@@ -2519,7 +2518,7 @@
   <p:cSld>
     <p:spTree>
       <p:nvGrpSpPr>
-        <p:cNvPr id="328" name="Shape 328"/>
+        <p:cNvPr id="327" name="Shape 327"/>
         <p:cNvGrpSpPr/>
         <p:nvPr/>
       </p:nvGrpSpPr>
@@ -2533,7 +2532,7 @@
       </p:grpSpPr>
       <p:sp>
         <p:nvSpPr>
-          <p:cNvPr id="329" name="Google Shape;329;gd04c478625_0_15:notes"/>
+          <p:cNvPr id="328" name="Google Shape;328;gcd8045d72a_1_21:notes"/>
           <p:cNvSpPr/>
           <p:nvPr>
             <p:ph idx="2" type="sldImg"/>
@@ -2568,7 +2567,7 @@
       </p:sp>
       <p:sp>
         <p:nvSpPr>
-          <p:cNvPr id="330" name="Google Shape;330;gd04c478625_0_15:notes"/>
+          <p:cNvPr id="329" name="Google Shape;329;gcd8045d72a_1_21:notes"/>
           <p:cNvSpPr txBox="1"/>
           <p:nvPr>
             <p:ph idx="1" type="body"/>
@@ -2618,7 +2617,7 @@
   <p:cSld>
     <p:spTree>
       <p:nvGrpSpPr>
-        <p:cNvPr id="335" name="Shape 335"/>
+        <p:cNvPr id="334" name="Shape 334"/>
         <p:cNvGrpSpPr/>
         <p:nvPr/>
       </p:nvGrpSpPr>
@@ -2632,7 +2631,7 @@
       </p:grpSpPr>
       <p:sp>
         <p:nvSpPr>
-          <p:cNvPr id="336" name="Google Shape;336;gcd8045d72a_1_21:notes"/>
+          <p:cNvPr id="335" name="Google Shape;335;gd04c478625_0_25:notes"/>
           <p:cNvSpPr/>
           <p:nvPr>
             <p:ph idx="2" type="sldImg"/>
@@ -2667,7 +2666,7 @@
       </p:sp>
       <p:sp>
         <p:nvSpPr>
-          <p:cNvPr id="337" name="Google Shape;337;gcd8045d72a_1_21:notes"/>
+          <p:cNvPr id="336" name="Google Shape;336;gd04c478625_0_25:notes"/>
           <p:cNvSpPr txBox="1"/>
           <p:nvPr>
             <p:ph idx="1" type="body"/>
@@ -2731,7 +2730,7 @@
       </p:grpSpPr>
       <p:sp>
         <p:nvSpPr>
-          <p:cNvPr id="343" name="Google Shape;343;gd04c478625_0_25:notes"/>
+          <p:cNvPr id="343" name="Google Shape;343;gd51e87aa91_0_13:notes"/>
           <p:cNvSpPr/>
           <p:nvPr>
             <p:ph idx="2" type="sldImg"/>
@@ -2766,7 +2765,7 @@
       </p:sp>
       <p:sp>
         <p:nvSpPr>
-          <p:cNvPr id="344" name="Google Shape;344;gd04c478625_0_25:notes"/>
+          <p:cNvPr id="344" name="Google Shape;344;gd51e87aa91_0_13:notes"/>
           <p:cNvSpPr txBox="1"/>
           <p:nvPr>
             <p:ph idx="1" type="body"/>
@@ -2816,7 +2815,7 @@
   <p:cSld>
     <p:spTree>
       <p:nvGrpSpPr>
-        <p:cNvPr id="350" name="Shape 350"/>
+        <p:cNvPr id="349" name="Shape 349"/>
         <p:cNvGrpSpPr/>
         <p:nvPr/>
       </p:nvGrpSpPr>
@@ -2830,7 +2829,7 @@
       </p:grpSpPr>
       <p:sp>
         <p:nvSpPr>
-          <p:cNvPr id="351" name="Google Shape;351;gd51e87aa91_0_13:notes"/>
+          <p:cNvPr id="350" name="Google Shape;350;gd51e87aa91_0_18:notes"/>
           <p:cNvSpPr/>
           <p:nvPr>
             <p:ph idx="2" type="sldImg"/>
@@ -2865,7 +2864,7 @@
       </p:sp>
       <p:sp>
         <p:nvSpPr>
-          <p:cNvPr id="352" name="Google Shape;352;gd51e87aa91_0_13:notes"/>
+          <p:cNvPr id="351" name="Google Shape;351;gd51e87aa91_0_18:notes"/>
           <p:cNvSpPr txBox="1"/>
           <p:nvPr>
             <p:ph idx="1" type="body"/>
@@ -3014,7 +3013,7 @@
   <p:cSld>
     <p:spTree>
       <p:nvGrpSpPr>
-        <p:cNvPr id="357" name="Shape 357"/>
+        <p:cNvPr id="355" name="Shape 355"/>
         <p:cNvGrpSpPr/>
         <p:nvPr/>
       </p:nvGrpSpPr>
@@ -3028,7 +3027,7 @@
       </p:grpSpPr>
       <p:sp>
         <p:nvSpPr>
-          <p:cNvPr id="358" name="Google Shape;358;gd51e87aa91_0_18:notes"/>
+          <p:cNvPr id="356" name="Google Shape;356;gcd8045cc97_0_12:notes"/>
           <p:cNvSpPr/>
           <p:nvPr>
             <p:ph idx="2" type="sldImg"/>
@@ -3063,106 +3062,7 @@
       </p:sp>
       <p:sp>
         <p:nvSpPr>
-          <p:cNvPr id="359" name="Google Shape;359;gd51e87aa91_0_18:notes"/>
-          <p:cNvSpPr txBox="1"/>
-          <p:nvPr>
-            <p:ph idx="1" type="body"/>
-          </p:nvPr>
-        </p:nvSpPr>
-        <p:spPr>
-          <a:xfrm>
-            <a:off x="685800" y="4343400"/>
-            <a:ext cx="5486400" cy="4114800"/>
-          </a:xfrm>
-          <a:prstGeom prst="rect">
-            <a:avLst/>
-          </a:prstGeom>
-        </p:spPr>
-        <p:txBody>
-          <a:bodyPr anchorCtr="0" anchor="t" bIns="91425" lIns="91425" spcFirstLastPara="1" rIns="91425" wrap="square" tIns="91425">
-            <a:noAutofit/>
-          </a:bodyPr>
-          <a:lstStyle/>
-          <a:p>
-            <a:pPr indent="0" lvl="0" marL="0" rtl="0" algn="l">
-              <a:spcBef>
-                <a:spcPts val="0"/>
-              </a:spcBef>
-              <a:spcAft>
-                <a:spcPts val="0"/>
-              </a:spcAft>
-              <a:buNone/>
-            </a:pPr>
-            <a:r>
-              <a:t/>
-            </a:r>
-            <a:endParaRPr/>
-          </a:p>
-        </p:txBody>
-      </p:sp>
-    </p:spTree>
-  </p:cSld>
-  <p:clrMapOvr>
-    <a:masterClrMapping/>
-  </p:clrMapOvr>
-</p:notes>
-</file>
-
-<file path=ppt/notesSlides/notesSlide31.xml><?xml version="1.0" encoding="utf-8"?>
-<p:notes xmlns:a="http://schemas.openxmlformats.org/drawingml/2006/main" xmlns:r="http://schemas.openxmlformats.org/officeDocument/2006/relationships" xmlns:mc="http://schemas.openxmlformats.org/markup-compatibility/2006" xmlns:mv="urn:schemas-microsoft-com:mac:vml" xmlns:p="http://schemas.openxmlformats.org/presentationml/2006/main" xmlns:c="http://schemas.openxmlformats.org/drawingml/2006/chart" xmlns:dgm="http://schemas.openxmlformats.org/drawingml/2006/diagram" xmlns:o="urn:schemas-microsoft-com:office:office" xmlns:v="urn:schemas-microsoft-com:vml" xmlns:pvml="urn:schemas-microsoft-com:office:powerpoint" xmlns:com="http://schemas.openxmlformats.org/drawingml/2006/compatibility" xmlns:p14="http://schemas.microsoft.com/office/powerpoint/2010/main" xmlns:p15="http://schemas.microsoft.com/office/powerpoint/2012/main" xmlns:ahyp="http://schemas.microsoft.com/office/drawing/2018/hyperlinkcolor" showMasterPhAnim="0" showMasterSp="0">
-  <p:cSld>
-    <p:spTree>
-      <p:nvGrpSpPr>
-        <p:cNvPr id="363" name="Shape 363"/>
-        <p:cNvGrpSpPr/>
-        <p:nvPr/>
-      </p:nvGrpSpPr>
-      <p:grpSpPr>
-        <a:xfrm>
-          <a:off x="0" y="0"/>
-          <a:ext cx="0" cy="0"/>
-          <a:chOff x="0" y="0"/>
-          <a:chExt cx="0" cy="0"/>
-        </a:xfrm>
-      </p:grpSpPr>
-      <p:sp>
-        <p:nvSpPr>
-          <p:cNvPr id="364" name="Google Shape;364;gcd8045cc97_0_12:notes"/>
-          <p:cNvSpPr/>
-          <p:nvPr>
-            <p:ph idx="2" type="sldImg"/>
-          </p:nvPr>
-        </p:nvSpPr>
-        <p:spPr>
-          <a:xfrm>
-            <a:off x="381300" y="685800"/>
-            <a:ext cx="6096000" cy="3429000"/>
-          </a:xfrm>
-          <a:custGeom>
-            <a:rect b="b" l="l" r="r" t="t"/>
-            <a:pathLst>
-              <a:path extrusionOk="0" h="120000" w="120000">
-                <a:moveTo>
-                  <a:pt x="0" y="0"/>
-                </a:moveTo>
-                <a:lnTo>
-                  <a:pt x="120000" y="0"/>
-                </a:lnTo>
-                <a:lnTo>
-                  <a:pt x="120000" y="120000"/>
-                </a:lnTo>
-                <a:lnTo>
-                  <a:pt x="0" y="120000"/>
-                </a:lnTo>
-                <a:close/>
-              </a:path>
-            </a:pathLst>
-          </a:custGeom>
-        </p:spPr>
-      </p:sp>
-      <p:sp>
-        <p:nvSpPr>
-          <p:cNvPr id="365" name="Google Shape;365;gcd8045cc97_0_12:notes"/>
+          <p:cNvPr id="357" name="Google Shape;357;gcd8045cc97_0_12:notes"/>
           <p:cNvSpPr txBox="1"/>
           <p:nvPr>
             <p:ph idx="1" type="body"/>
@@ -14132,7 +14032,7 @@
         </p:spPr>
         <p:txBody>
           <a:bodyPr anchorCtr="0" anchor="t" bIns="91425" lIns="91425" spcFirstLastPara="1" rIns="91425" wrap="square" tIns="91425">
-            <a:normAutofit/>
+            <a:normAutofit fontScale="90000"/>
           </a:bodyPr>
           <a:lstStyle/>
           <a:p>
@@ -14146,10 +14046,25 @@
               <a:buNone/>
             </a:pPr>
             <a:r>
-              <a:rPr lang="en"/>
+              <a:rPr lang="en" sz="2511"/>
               <a:t>Sign-up Page cont’d</a:t>
             </a:r>
-            <a:endParaRPr/>
+            <a:endParaRPr sz="2511"/>
+          </a:p>
+          <a:p>
+            <a:pPr indent="0" lvl="0" marL="0" rtl="0" algn="l">
+              <a:spcBef>
+                <a:spcPts val="0"/>
+              </a:spcBef>
+              <a:spcAft>
+                <a:spcPts val="0"/>
+              </a:spcAft>
+              <a:buNone/>
+            </a:pPr>
+            <a:r>
+              <a:t/>
+            </a:r>
+            <a:endParaRPr sz="2511"/>
           </a:p>
         </p:txBody>
       </p:sp>
@@ -14211,6 +14126,54 @@
       <p:sp>
         <p:nvSpPr>
           <p:cNvPr id="279" name="Google Shape;279;p31"/>
+          <p:cNvSpPr txBox="1"/>
+          <p:nvPr>
+            <p:ph idx="1" type="body"/>
+          </p:nvPr>
+        </p:nvSpPr>
+        <p:spPr>
+          <a:xfrm>
+            <a:off x="1341300" y="1069375"/>
+            <a:ext cx="7038900" cy="521700"/>
+          </a:xfrm>
+          <a:prstGeom prst="rect">
+            <a:avLst/>
+          </a:prstGeom>
+        </p:spPr>
+        <p:txBody>
+          <a:bodyPr anchorCtr="0" anchor="t" bIns="91425" lIns="91425" spcFirstLastPara="1" rIns="91425" wrap="square" tIns="91425">
+            <a:normAutofit/>
+          </a:bodyPr>
+          <a:lstStyle/>
+          <a:p>
+            <a:pPr indent="0" lvl="0" marL="0" rtl="0" algn="l">
+              <a:spcBef>
+                <a:spcPts val="0"/>
+              </a:spcBef>
+              <a:spcAft>
+                <a:spcPts val="1200"/>
+              </a:spcAft>
+              <a:buNone/>
+            </a:pPr>
+            <a:r>
+              <a:rPr lang="en" sz="1800"/>
+              <a:t>onSignUpClick():  This </a:t>
+            </a:r>
+            <a:r>
+              <a:rPr lang="en" sz="1800"/>
+              <a:t>function</a:t>
+            </a:r>
+            <a:r>
+              <a:rPr lang="en" sz="1800"/>
+              <a:t> handles the signup actions.</a:t>
+            </a:r>
+            <a:endParaRPr sz="1800"/>
+          </a:p>
+        </p:txBody>
+      </p:sp>
+      <p:sp>
+        <p:nvSpPr>
+          <p:cNvPr id="280" name="Google Shape;280;p31"/>
           <p:cNvSpPr txBox="1"/>
           <p:nvPr>
             <p:ph idx="12" type="sldNum"/>
@@ -14422,7 +14385,7 @@
   <p:cSld>
     <p:spTree>
       <p:nvGrpSpPr>
-        <p:cNvPr id="283" name="Shape 283"/>
+        <p:cNvPr id="284" name="Shape 284"/>
         <p:cNvGrpSpPr/>
         <p:nvPr/>
       </p:nvGrpSpPr>
@@ -14436,7 +14399,7 @@
       </p:grpSpPr>
       <p:sp>
         <p:nvSpPr>
-          <p:cNvPr id="284" name="Google Shape;284;p32"/>
+          <p:cNvPr id="285" name="Google Shape;285;p32"/>
           <p:cNvSpPr txBox="1"/>
           <p:nvPr>
             <p:ph type="title"/>
@@ -14476,7 +14439,7 @@
       </p:sp>
       <p:pic>
         <p:nvPicPr>
-          <p:cNvPr id="285" name="Google Shape;285;p32"/>
+          <p:cNvPr id="286" name="Google Shape;286;p32"/>
           <p:cNvPicPr preferRelativeResize="0"/>
           <p:nvPr/>
         </p:nvPicPr>
@@ -14504,7 +14467,7 @@
       </p:pic>
       <p:sp>
         <p:nvSpPr>
-          <p:cNvPr id="286" name="Google Shape;286;p32"/>
+          <p:cNvPr id="287" name="Google Shape;287;p32"/>
           <p:cNvSpPr txBox="1"/>
           <p:nvPr>
             <p:ph idx="1" type="body"/>
@@ -14536,7 +14499,7 @@
             </a:pPr>
             <a:r>
               <a:rPr lang="en" sz="1800"/>
-              <a:t>The Admin Dashboard encompasses all of the actions that can be performed by a user, in addition to having the ability to edit items, users and accept/reject requests.</a:t>
+              <a:t>The Admin Dashboard encompasses all of the actions that can be performed by a user, in addition to having the ability to edit items, users, and accept/reject requests.</a:t>
             </a:r>
             <a:endParaRPr sz="1800"/>
           </a:p>
@@ -14544,7 +14507,7 @@
       </p:sp>
       <p:sp>
         <p:nvSpPr>
-          <p:cNvPr id="287" name="Google Shape;287;p32"/>
+          <p:cNvPr id="288" name="Google Shape;288;p32"/>
           <p:cNvSpPr txBox="1"/>
           <p:nvPr>
             <p:ph idx="12" type="sldNum"/>
@@ -14595,7 +14558,7 @@
   <p:cSld>
     <p:spTree>
       <p:nvGrpSpPr>
-        <p:cNvPr id="291" name="Shape 291"/>
+        <p:cNvPr id="292" name="Shape 292"/>
         <p:cNvGrpSpPr/>
         <p:nvPr/>
       </p:nvGrpSpPr>
@@ -14609,7 +14572,7 @@
       </p:grpSpPr>
       <p:sp>
         <p:nvSpPr>
-          <p:cNvPr id="292" name="Google Shape;292;p33"/>
+          <p:cNvPr id="293" name="Google Shape;293;p33"/>
           <p:cNvSpPr txBox="1"/>
           <p:nvPr>
             <p:ph type="title"/>
@@ -14647,23 +14610,65 @@
           </a:p>
         </p:txBody>
       </p:sp>
+      <p:sp>
+        <p:nvSpPr>
+          <p:cNvPr id="294" name="Google Shape;294;p33"/>
+          <p:cNvSpPr txBox="1"/>
+          <p:nvPr>
+            <p:ph idx="1" type="body"/>
+          </p:nvPr>
+        </p:nvSpPr>
+        <p:spPr>
+          <a:xfrm>
+            <a:off x="1338275" y="1069375"/>
+            <a:ext cx="8415300" cy="521700"/>
+          </a:xfrm>
+          <a:prstGeom prst="rect">
+            <a:avLst/>
+          </a:prstGeom>
+        </p:spPr>
+        <p:txBody>
+          <a:bodyPr anchorCtr="0" anchor="t" bIns="91425" lIns="91425" spcFirstLastPara="1" rIns="91425" wrap="square" tIns="91425">
+            <a:noAutofit/>
+          </a:bodyPr>
+          <a:lstStyle/>
+          <a:p>
+            <a:pPr indent="0" lvl="0" marL="0" rtl="0" algn="l">
+              <a:spcBef>
+                <a:spcPts val="0"/>
+              </a:spcBef>
+              <a:spcAft>
+                <a:spcPts val="1200"/>
+              </a:spcAft>
+              <a:buSzPts val="770"/>
+              <a:buNone/>
+            </a:pPr>
+            <a:r>
+              <a:rPr lang="en" sz="1530"/>
+              <a:t>onAddUser(): This function handles adding users when the Add User Button is pressed</a:t>
+            </a:r>
+            <a:endParaRPr sz="1530"/>
+          </a:p>
+        </p:txBody>
+      </p:sp>
       <p:pic>
         <p:nvPicPr>
-          <p:cNvPr id="293" name="Google Shape;293;p33"/>
+          <p:cNvPr id="295" name="Google Shape;295;p33"/>
           <p:cNvPicPr preferRelativeResize="0"/>
           <p:nvPr/>
         </p:nvPicPr>
-        <p:blipFill rotWithShape="1">
+        <p:blipFill>
           <a:blip r:embed="rId3">
             <a:alphaModFix/>
           </a:blip>
-          <a:srcRect b="24772" l="0" r="22178" t="0"/>
-          <a:stretch/>
+          <a:stretch>
+            <a:fillRect/>
+          </a:stretch>
         </p:blipFill>
         <p:spPr>
           <a:xfrm>
-            <a:off x="264900" y="1821850"/>
-            <a:ext cx="3945524" cy="2703299"/>
+            <a:off x="2522775" y="1591075"/>
+            <a:ext cx="3908296" cy="3247627"/>
           </a:xfrm>
           <a:prstGeom prst="rect">
             <a:avLst/>
@@ -14674,82 +14679,6 @@
           </a:ln>
         </p:spPr>
       </p:pic>
-      <p:pic>
-        <p:nvPicPr>
-          <p:cNvPr id="294" name="Google Shape;294;p33"/>
-          <p:cNvPicPr preferRelativeResize="0"/>
-          <p:nvPr/>
-        </p:nvPicPr>
-        <p:blipFill>
-          <a:blip r:embed="rId4">
-            <a:alphaModFix/>
-          </a:blip>
-          <a:stretch>
-            <a:fillRect/>
-          </a:stretch>
-        </p:blipFill>
-        <p:spPr>
-          <a:xfrm>
-            <a:off x="4572000" y="1983238"/>
-            <a:ext cx="4427426" cy="2380525"/>
-          </a:xfrm>
-          <a:prstGeom prst="rect">
-            <a:avLst/>
-          </a:prstGeom>
-          <a:noFill/>
-          <a:ln>
-            <a:noFill/>
-          </a:ln>
-        </p:spPr>
-      </p:pic>
-      <p:sp>
-        <p:nvSpPr>
-          <p:cNvPr id="295" name="Google Shape;295;p33"/>
-          <p:cNvSpPr txBox="1"/>
-          <p:nvPr>
-            <p:ph idx="1" type="body"/>
-          </p:nvPr>
-        </p:nvSpPr>
-        <p:spPr>
-          <a:xfrm>
-            <a:off x="1341300" y="1069375"/>
-            <a:ext cx="7038900" cy="521700"/>
-          </a:xfrm>
-          <a:prstGeom prst="rect">
-            <a:avLst/>
-          </a:prstGeom>
-        </p:spPr>
-        <p:txBody>
-          <a:bodyPr anchorCtr="0" anchor="t" bIns="91425" lIns="91425" spcFirstLastPara="1" rIns="91425" wrap="square" tIns="91425">
-            <a:normAutofit/>
-          </a:bodyPr>
-          <a:lstStyle/>
-          <a:p>
-            <a:pPr indent="0" lvl="0" marL="0" rtl="0" algn="l">
-              <a:spcBef>
-                <a:spcPts val="0"/>
-              </a:spcBef>
-              <a:spcAft>
-                <a:spcPts val="1200"/>
-              </a:spcAft>
-              <a:buNone/>
-            </a:pPr>
-            <a:r>
-              <a:rPr lang="en" sz="1900"/>
-              <a:t>onSignUpClick():  This </a:t>
-            </a:r>
-            <a:r>
-              <a:rPr lang="en" sz="1900"/>
-              <a:t>function</a:t>
-            </a:r>
-            <a:r>
-              <a:rPr lang="en" sz="1900"/>
-              <a:t> handles the signup actions.</a:t>
-            </a:r>
-            <a:endParaRPr sz="1900"/>
-          </a:p>
-        </p:txBody>
-      </p:sp>
       <p:sp>
         <p:nvSpPr>
           <p:cNvPr id="296" name="Google Shape;296;p33"/>
@@ -14849,56 +14778,15 @@
             </a:pPr>
             <a:r>
               <a:rPr lang="en"/>
-              <a:t>Admin Dashboard cont’d</a:t>
+              <a:t>User Dashboard</a:t>
             </a:r>
             <a:endParaRPr/>
           </a:p>
         </p:txBody>
       </p:sp>
-      <p:sp>
-        <p:nvSpPr>
-          <p:cNvPr id="302" name="Google Shape;302;p34"/>
-          <p:cNvSpPr txBox="1"/>
-          <p:nvPr>
-            <p:ph idx="1" type="body"/>
-          </p:nvPr>
-        </p:nvSpPr>
-        <p:spPr>
-          <a:xfrm>
-            <a:off x="1338275" y="1069375"/>
-            <a:ext cx="8415300" cy="521700"/>
-          </a:xfrm>
-          <a:prstGeom prst="rect">
-            <a:avLst/>
-          </a:prstGeom>
-        </p:spPr>
-        <p:txBody>
-          <a:bodyPr anchorCtr="0" anchor="t" bIns="91425" lIns="91425" spcFirstLastPara="1" rIns="91425" wrap="square" tIns="91425">
-            <a:noAutofit/>
-          </a:bodyPr>
-          <a:lstStyle/>
-          <a:p>
-            <a:pPr indent="0" lvl="0" marL="0" rtl="0" algn="l">
-              <a:spcBef>
-                <a:spcPts val="0"/>
-              </a:spcBef>
-              <a:spcAft>
-                <a:spcPts val="1200"/>
-              </a:spcAft>
-              <a:buSzPts val="770"/>
-              <a:buNone/>
-            </a:pPr>
-            <a:r>
-              <a:rPr lang="en" sz="1530"/>
-              <a:t>onAddUser(): This function handles adding users when the Add User Button is pressed</a:t>
-            </a:r>
-            <a:endParaRPr sz="1530"/>
-          </a:p>
-        </p:txBody>
-      </p:sp>
       <p:pic>
         <p:nvPicPr>
-          <p:cNvPr id="303" name="Google Shape;303;p34"/>
+          <p:cNvPr id="302" name="Google Shape;302;p34"/>
           <p:cNvPicPr preferRelativeResize="0"/>
           <p:nvPr/>
         </p:nvPicPr>
@@ -14912,8 +14800,8 @@
         </p:blipFill>
         <p:spPr>
           <a:xfrm>
-            <a:off x="2522775" y="1591075"/>
-            <a:ext cx="3908296" cy="3247627"/>
+            <a:off x="3998225" y="1307850"/>
+            <a:ext cx="4760100" cy="3391099"/>
           </a:xfrm>
           <a:prstGeom prst="rect">
             <a:avLst/>
@@ -14924,6 +14812,67 @@
           </a:ln>
         </p:spPr>
       </p:pic>
+      <p:sp>
+        <p:nvSpPr>
+          <p:cNvPr id="303" name="Google Shape;303;p34"/>
+          <p:cNvSpPr txBox="1"/>
+          <p:nvPr/>
+        </p:nvSpPr>
+        <p:spPr>
+          <a:xfrm>
+            <a:off x="870025" y="1550350"/>
+            <a:ext cx="2960100" cy="2692200"/>
+          </a:xfrm>
+          <a:prstGeom prst="rect">
+            <a:avLst/>
+          </a:prstGeom>
+          <a:noFill/>
+          <a:ln>
+            <a:noFill/>
+          </a:ln>
+        </p:spPr>
+        <p:txBody>
+          <a:bodyPr anchorCtr="0" anchor="t" bIns="91425" lIns="91425" spcFirstLastPara="1" rIns="91425" wrap="square" tIns="91425">
+            <a:spAutoFit/>
+          </a:bodyPr>
+          <a:lstStyle/>
+          <a:p>
+            <a:pPr indent="0" lvl="0" marL="0" rtl="0" algn="l">
+              <a:lnSpc>
+                <a:spcPct val="115000"/>
+              </a:lnSpc>
+              <a:spcBef>
+                <a:spcPts val="0"/>
+              </a:spcBef>
+              <a:spcAft>
+                <a:spcPts val="1200"/>
+              </a:spcAft>
+              <a:buNone/>
+            </a:pPr>
+            <a:r>
+              <a:rPr lang="en" sz="1800">
+                <a:solidFill>
+                  <a:schemeClr val="lt1"/>
+                </a:solidFill>
+                <a:latin typeface="Lato"/>
+                <a:ea typeface="Lato"/>
+                <a:cs typeface="Lato"/>
+                <a:sym typeface="Lato"/>
+              </a:rPr>
+              <a:t>The User Dashboard class encompasses all user functionality. Things like requesting/borrowing items, adding personalized favorite items, displaying different table information and more.</a:t>
+            </a:r>
+            <a:endParaRPr sz="1900">
+              <a:solidFill>
+                <a:schemeClr val="lt1"/>
+              </a:solidFill>
+              <a:latin typeface="Lato"/>
+              <a:ea typeface="Lato"/>
+              <a:cs typeface="Lato"/>
+              <a:sym typeface="Lato"/>
+            </a:endParaRPr>
+          </a:p>
+        </p:txBody>
+      </p:sp>
       <p:sp>
         <p:nvSpPr>
           <p:cNvPr id="304" name="Google Shape;304;p34"/>
@@ -15023,15 +14972,55 @@
             </a:pPr>
             <a:r>
               <a:rPr lang="en"/>
-              <a:t>User Dashboard</a:t>
+              <a:t>User Dashboard cont’d</a:t>
             </a:r>
             <a:endParaRPr/>
           </a:p>
         </p:txBody>
       </p:sp>
+      <p:sp>
+        <p:nvSpPr>
+          <p:cNvPr id="310" name="Google Shape;310;p35"/>
+          <p:cNvSpPr txBox="1"/>
+          <p:nvPr>
+            <p:ph idx="1" type="body"/>
+          </p:nvPr>
+        </p:nvSpPr>
+        <p:spPr>
+          <a:xfrm>
+            <a:off x="898650" y="1585875"/>
+            <a:ext cx="2961600" cy="3061500"/>
+          </a:xfrm>
+          <a:prstGeom prst="rect">
+            <a:avLst/>
+          </a:prstGeom>
+        </p:spPr>
+        <p:txBody>
+          <a:bodyPr anchorCtr="0" anchor="t" bIns="91425" lIns="91425" spcFirstLastPara="1" rIns="91425" wrap="square" tIns="91425">
+            <a:normAutofit/>
+          </a:bodyPr>
+          <a:lstStyle/>
+          <a:p>
+            <a:pPr indent="0" lvl="0" marL="0" rtl="0" algn="l">
+              <a:spcBef>
+                <a:spcPts val="0"/>
+              </a:spcBef>
+              <a:spcAft>
+                <a:spcPts val="1200"/>
+              </a:spcAft>
+              <a:buNone/>
+            </a:pPr>
+            <a:r>
+              <a:rPr lang="en" sz="1900"/>
+              <a:t>This function handled the request functionality - in which each user can select an item from the database and request to borrow for an allotted time.</a:t>
+            </a:r>
+            <a:endParaRPr sz="1900"/>
+          </a:p>
+        </p:txBody>
+      </p:sp>
       <p:pic>
         <p:nvPicPr>
-          <p:cNvPr id="310" name="Google Shape;310;p35"/>
+          <p:cNvPr id="311" name="Google Shape;311;p35"/>
           <p:cNvPicPr preferRelativeResize="0"/>
           <p:nvPr/>
         </p:nvPicPr>
@@ -15045,8 +15034,8 @@
         </p:blipFill>
         <p:spPr>
           <a:xfrm>
-            <a:off x="3998225" y="1307850"/>
-            <a:ext cx="4760100" cy="3391099"/>
+            <a:off x="4012650" y="985475"/>
+            <a:ext cx="4897976" cy="3677750"/>
           </a:xfrm>
           <a:prstGeom prst="rect">
             <a:avLst/>
@@ -15057,67 +15046,6 @@
           </a:ln>
         </p:spPr>
       </p:pic>
-      <p:sp>
-        <p:nvSpPr>
-          <p:cNvPr id="311" name="Google Shape;311;p35"/>
-          <p:cNvSpPr txBox="1"/>
-          <p:nvPr/>
-        </p:nvSpPr>
-        <p:spPr>
-          <a:xfrm>
-            <a:off x="870025" y="1550350"/>
-            <a:ext cx="2960100" cy="2692200"/>
-          </a:xfrm>
-          <a:prstGeom prst="rect">
-            <a:avLst/>
-          </a:prstGeom>
-          <a:noFill/>
-          <a:ln>
-            <a:noFill/>
-          </a:ln>
-        </p:spPr>
-        <p:txBody>
-          <a:bodyPr anchorCtr="0" anchor="t" bIns="91425" lIns="91425" spcFirstLastPara="1" rIns="91425" wrap="square" tIns="91425">
-            <a:spAutoFit/>
-          </a:bodyPr>
-          <a:lstStyle/>
-          <a:p>
-            <a:pPr indent="0" lvl="0" marL="0" rtl="0" algn="l">
-              <a:lnSpc>
-                <a:spcPct val="115000"/>
-              </a:lnSpc>
-              <a:spcBef>
-                <a:spcPts val="0"/>
-              </a:spcBef>
-              <a:spcAft>
-                <a:spcPts val="1200"/>
-              </a:spcAft>
-              <a:buNone/>
-            </a:pPr>
-            <a:r>
-              <a:rPr lang="en" sz="1800">
-                <a:solidFill>
-                  <a:schemeClr val="lt1"/>
-                </a:solidFill>
-                <a:latin typeface="Lato"/>
-                <a:ea typeface="Lato"/>
-                <a:cs typeface="Lato"/>
-                <a:sym typeface="Lato"/>
-              </a:rPr>
-              <a:t>The User Dashboard class encompasses all user functionality. Things like requesting/borrowing items, adding personalized favorite items, displaying different table information and more.</a:t>
-            </a:r>
-            <a:endParaRPr sz="1900">
-              <a:solidFill>
-                <a:schemeClr val="lt1"/>
-              </a:solidFill>
-              <a:latin typeface="Lato"/>
-              <a:ea typeface="Lato"/>
-              <a:cs typeface="Lato"/>
-              <a:sym typeface="Lato"/>
-            </a:endParaRPr>
-          </a:p>
-        </p:txBody>
-      </p:sp>
       <p:sp>
         <p:nvSpPr>
           <p:cNvPr id="312" name="Google Shape;312;p35"/>
@@ -15217,7 +15145,7 @@
             </a:pPr>
             <a:r>
               <a:rPr lang="en"/>
-              <a:t>User Dashboard cont’d</a:t>
+              <a:t>New Features</a:t>
             </a:r>
             <a:endParaRPr/>
           </a:p>
@@ -15233,8 +15161,8 @@
         </p:nvSpPr>
         <p:spPr>
           <a:xfrm>
-            <a:off x="898650" y="1585875"/>
-            <a:ext cx="2961600" cy="3061500"/>
+            <a:off x="1297500" y="1567550"/>
+            <a:ext cx="7038900" cy="2911200"/>
           </a:xfrm>
           <a:prstGeom prst="rect">
             <a:avLst/>
@@ -15251,49 +15179,72 @@
                 <a:spcPts val="0"/>
               </a:spcBef>
               <a:spcAft>
-                <a:spcPts val="1200"/>
+                <a:spcPts val="0"/>
               </a:spcAft>
               <a:buNone/>
             </a:pPr>
             <a:r>
               <a:rPr lang="en" sz="1900"/>
-              <a:t>This function handled the request functionality - in which each user can select an item from the database and request to borrow for an allotted time.</a:t>
+              <a:t>Throughout the course of our project, we implemented a few additional features to add to the enjoyment and security of the User Experience:</a:t>
+            </a:r>
+            <a:endParaRPr sz="1900"/>
+          </a:p>
+          <a:p>
+            <a:pPr indent="-349250" lvl="0" marL="457200" rtl="0" algn="l">
+              <a:spcBef>
+                <a:spcPts val="1200"/>
+              </a:spcBef>
+              <a:spcAft>
+                <a:spcPts val="0"/>
+              </a:spcAft>
+              <a:buSzPts val="1900"/>
+              <a:buChar char="●"/>
+            </a:pPr>
+            <a:r>
+              <a:rPr lang="en" sz="1900"/>
+              <a:t>The Sign up and Sign in Option</a:t>
+            </a:r>
+            <a:endParaRPr sz="1900"/>
+          </a:p>
+          <a:p>
+            <a:pPr indent="-349250" lvl="0" marL="457200" rtl="0" algn="l">
+              <a:spcBef>
+                <a:spcPts val="0"/>
+              </a:spcBef>
+              <a:spcAft>
+                <a:spcPts val="0"/>
+              </a:spcAft>
+              <a:buSzPts val="1900"/>
+              <a:buChar char="●"/>
+            </a:pPr>
+            <a:r>
+              <a:rPr lang="en" sz="1900"/>
+              <a:t>MD5 Hashing of User Passwords</a:t>
+            </a:r>
+            <a:endParaRPr sz="1900"/>
+          </a:p>
+          <a:p>
+            <a:pPr indent="-349250" lvl="0" marL="457200" rtl="0" algn="l">
+              <a:spcBef>
+                <a:spcPts val="0"/>
+              </a:spcBef>
+              <a:spcAft>
+                <a:spcPts val="0"/>
+              </a:spcAft>
+              <a:buSzPts val="1900"/>
+              <a:buChar char="●"/>
+            </a:pPr>
+            <a:r>
+              <a:rPr lang="en" sz="1900"/>
+              <a:t>Loading/Exit GIF for starting and closing the application</a:t>
             </a:r>
             <a:endParaRPr sz="1900"/>
           </a:p>
         </p:txBody>
       </p:sp>
-      <p:pic>
-        <p:nvPicPr>
-          <p:cNvPr id="319" name="Google Shape;319;p36"/>
-          <p:cNvPicPr preferRelativeResize="0"/>
-          <p:nvPr/>
-        </p:nvPicPr>
-        <p:blipFill>
-          <a:blip r:embed="rId3">
-            <a:alphaModFix/>
-          </a:blip>
-          <a:stretch>
-            <a:fillRect/>
-          </a:stretch>
-        </p:blipFill>
-        <p:spPr>
-          <a:xfrm>
-            <a:off x="4012650" y="985475"/>
-            <a:ext cx="4897976" cy="3677750"/>
-          </a:xfrm>
-          <a:prstGeom prst="rect">
-            <a:avLst/>
-          </a:prstGeom>
-          <a:noFill/>
-          <a:ln>
-            <a:noFill/>
-          </a:ln>
-        </p:spPr>
-      </p:pic>
       <p:sp>
         <p:nvSpPr>
-          <p:cNvPr id="320" name="Google Shape;320;p36"/>
+          <p:cNvPr id="319" name="Google Shape;319;p36"/>
           <p:cNvSpPr txBox="1"/>
           <p:nvPr>
             <p:ph idx="12" type="sldNum"/>
@@ -15344,7 +15295,7 @@
   <p:cSld>
     <p:spTree>
       <p:nvGrpSpPr>
-        <p:cNvPr id="324" name="Shape 324"/>
+        <p:cNvPr id="323" name="Shape 323"/>
         <p:cNvGrpSpPr/>
         <p:nvPr/>
       </p:nvGrpSpPr>
@@ -15358,7 +15309,7 @@
       </p:grpSpPr>
       <p:sp>
         <p:nvSpPr>
-          <p:cNvPr id="325" name="Google Shape;325;p37"/>
+          <p:cNvPr id="324" name="Google Shape;324;p37"/>
           <p:cNvSpPr txBox="1"/>
           <p:nvPr>
             <p:ph type="title"/>
@@ -15390,7 +15341,7 @@
             </a:pPr>
             <a:r>
               <a:rPr lang="en"/>
-              <a:t>New Features</a:t>
+              <a:t>MD5 Hashing of User Passwords</a:t>
             </a:r>
             <a:endParaRPr/>
           </a:p>
@@ -15398,7 +15349,7 @@
       </p:sp>
       <p:sp>
         <p:nvSpPr>
-          <p:cNvPr id="326" name="Google Shape;326;p37"/>
+          <p:cNvPr id="325" name="Google Shape;325;p37"/>
           <p:cNvSpPr txBox="1"/>
           <p:nvPr>
             <p:ph idx="1" type="body"/>
@@ -15430,7 +15381,31 @@
             </a:pPr>
             <a:r>
               <a:rPr lang="en" sz="1900"/>
-              <a:t>Throughout the course of our project, we implemented a few additional features to add to the enjoyment and security of the User Experience:</a:t>
+              <a:t>To </a:t>
+            </a:r>
+            <a:r>
+              <a:rPr lang="en" sz="1900"/>
+              <a:t>enhance</a:t>
+            </a:r>
+            <a:r>
+              <a:rPr lang="en" sz="1900"/>
+              <a:t> user security, the team decided to hash user passwords using MD5 and stored these values in the database instead of plain-text passwords. </a:t>
+            </a:r>
+            <a:endParaRPr sz="1900"/>
+          </a:p>
+          <a:p>
+            <a:pPr indent="0" lvl="0" marL="0" rtl="0" algn="l">
+              <a:spcBef>
+                <a:spcPts val="1200"/>
+              </a:spcBef>
+              <a:spcAft>
+                <a:spcPts val="0"/>
+              </a:spcAft>
+              <a:buNone/>
+            </a:pPr>
+            <a:r>
+              <a:rPr lang="en" sz="1900"/>
+              <a:t>The process to verify that passwords match:</a:t>
             </a:r>
             <a:endParaRPr sz="1900"/>
           </a:p>
@@ -15447,7 +15422,7 @@
             </a:pPr>
             <a:r>
               <a:rPr lang="en" sz="1900"/>
-              <a:t>The Sign up and Sign in Option</a:t>
+              <a:t>Take user input</a:t>
             </a:r>
             <a:endParaRPr sz="1900"/>
           </a:p>
@@ -15464,7 +15439,7 @@
             </a:pPr>
             <a:r>
               <a:rPr lang="en" sz="1900"/>
-              <a:t>MD5 Hashing of User Passwords</a:t>
+              <a:t>Hashes it</a:t>
             </a:r>
             <a:endParaRPr sz="1900"/>
           </a:p>
@@ -15481,7 +15456,15 @@
             </a:pPr>
             <a:r>
               <a:rPr lang="en" sz="1900"/>
-              <a:t>Loading/Exit GIF for starting and closing the application</a:t>
+              <a:t>Compares it to the </a:t>
+            </a:r>
+            <a:r>
+              <a:rPr lang="en" sz="1900"/>
+              <a:t>stored</a:t>
+            </a:r>
+            <a:r>
+              <a:rPr lang="en" sz="1900"/>
+              <a:t> data to make sure it matches</a:t>
             </a:r>
             <a:endParaRPr sz="1900"/>
           </a:p>
@@ -15489,7 +15472,7 @@
       </p:sp>
       <p:sp>
         <p:nvSpPr>
-          <p:cNvPr id="327" name="Google Shape;327;p37"/>
+          <p:cNvPr id="326" name="Google Shape;326;p37"/>
           <p:cNvSpPr txBox="1"/>
           <p:nvPr>
             <p:ph idx="12" type="sldNum"/>
@@ -15540,7 +15523,7 @@
   <p:cSld>
     <p:spTree>
       <p:nvGrpSpPr>
-        <p:cNvPr id="331" name="Shape 331"/>
+        <p:cNvPr id="330" name="Shape 330"/>
         <p:cNvGrpSpPr/>
         <p:nvPr/>
       </p:nvGrpSpPr>
@@ -15554,7 +15537,7 @@
       </p:grpSpPr>
       <p:sp>
         <p:nvSpPr>
-          <p:cNvPr id="332" name="Google Shape;332;p38"/>
+          <p:cNvPr id="331" name="Google Shape;331;p38"/>
           <p:cNvSpPr txBox="1"/>
           <p:nvPr>
             <p:ph type="title"/>
@@ -15586,138 +15569,43 @@
             </a:pPr>
             <a:r>
               <a:rPr lang="en"/>
-              <a:t>MD5 Hashing of User Passwords</a:t>
+              <a:t>MD5 Hashing cont’d</a:t>
             </a:r>
             <a:endParaRPr/>
           </a:p>
         </p:txBody>
       </p:sp>
+      <p:pic>
+        <p:nvPicPr>
+          <p:cNvPr id="332" name="Google Shape;332;p38"/>
+          <p:cNvPicPr preferRelativeResize="0"/>
+          <p:nvPr/>
+        </p:nvPicPr>
+        <p:blipFill>
+          <a:blip r:embed="rId3">
+            <a:alphaModFix/>
+          </a:blip>
+          <a:stretch>
+            <a:fillRect/>
+          </a:stretch>
+        </p:blipFill>
+        <p:spPr>
+          <a:xfrm>
+            <a:off x="2226600" y="1251325"/>
+            <a:ext cx="5180705" cy="3530850"/>
+          </a:xfrm>
+          <a:prstGeom prst="rect">
+            <a:avLst/>
+          </a:prstGeom>
+          <a:noFill/>
+          <a:ln>
+            <a:noFill/>
+          </a:ln>
+        </p:spPr>
+      </p:pic>
       <p:sp>
         <p:nvSpPr>
           <p:cNvPr id="333" name="Google Shape;333;p38"/>
-          <p:cNvSpPr txBox="1"/>
-          <p:nvPr>
-            <p:ph idx="1" type="body"/>
-          </p:nvPr>
-        </p:nvSpPr>
-        <p:spPr>
-          <a:xfrm>
-            <a:off x="1297500" y="1567550"/>
-            <a:ext cx="7038900" cy="2911200"/>
-          </a:xfrm>
-          <a:prstGeom prst="rect">
-            <a:avLst/>
-          </a:prstGeom>
-        </p:spPr>
-        <p:txBody>
-          <a:bodyPr anchorCtr="0" anchor="t" bIns="91425" lIns="91425" spcFirstLastPara="1" rIns="91425" wrap="square" tIns="91425">
-            <a:normAutofit/>
-          </a:bodyPr>
-          <a:lstStyle/>
-          <a:p>
-            <a:pPr indent="0" lvl="0" marL="0" rtl="0" algn="l">
-              <a:spcBef>
-                <a:spcPts val="0"/>
-              </a:spcBef>
-              <a:spcAft>
-                <a:spcPts val="0"/>
-              </a:spcAft>
-              <a:buNone/>
-            </a:pPr>
-            <a:r>
-              <a:rPr lang="en" sz="1900"/>
-              <a:t>To </a:t>
-            </a:r>
-            <a:r>
-              <a:rPr lang="en" sz="1900"/>
-              <a:t>enhance</a:t>
-            </a:r>
-            <a:r>
-              <a:rPr lang="en" sz="1900"/>
-              <a:t> user security, the team decided to hash user passwords using MD5 and stored these values in the database instead of plain-text passwords. </a:t>
-            </a:r>
-            <a:endParaRPr sz="1900"/>
-          </a:p>
-          <a:p>
-            <a:pPr indent="0" lvl="0" marL="0" rtl="0" algn="l">
-              <a:spcBef>
-                <a:spcPts val="1200"/>
-              </a:spcBef>
-              <a:spcAft>
-                <a:spcPts val="0"/>
-              </a:spcAft>
-              <a:buNone/>
-            </a:pPr>
-            <a:r>
-              <a:rPr lang="en" sz="1900"/>
-              <a:t>The process to verify that passwords match:</a:t>
-            </a:r>
-            <a:endParaRPr sz="1900"/>
-          </a:p>
-          <a:p>
-            <a:pPr indent="-349250" lvl="0" marL="457200" rtl="0" algn="l">
-              <a:spcBef>
-                <a:spcPts val="1200"/>
-              </a:spcBef>
-              <a:spcAft>
-                <a:spcPts val="0"/>
-              </a:spcAft>
-              <a:buSzPts val="1900"/>
-              <a:buChar char="●"/>
-            </a:pPr>
-            <a:r>
-              <a:rPr lang="en" sz="1900"/>
-              <a:t>Take user input</a:t>
-            </a:r>
-            <a:endParaRPr sz="1900"/>
-          </a:p>
-          <a:p>
-            <a:pPr indent="-349250" lvl="0" marL="457200" rtl="0" algn="l">
-              <a:spcBef>
-                <a:spcPts val="0"/>
-              </a:spcBef>
-              <a:spcAft>
-                <a:spcPts val="0"/>
-              </a:spcAft>
-              <a:buSzPts val="1900"/>
-              <a:buChar char="●"/>
-            </a:pPr>
-            <a:r>
-              <a:rPr lang="en" sz="1900"/>
-              <a:t>Hashes it</a:t>
-            </a:r>
-            <a:endParaRPr sz="1900"/>
-          </a:p>
-          <a:p>
-            <a:pPr indent="-349250" lvl="0" marL="457200" rtl="0" algn="l">
-              <a:spcBef>
-                <a:spcPts val="0"/>
-              </a:spcBef>
-              <a:spcAft>
-                <a:spcPts val="0"/>
-              </a:spcAft>
-              <a:buSzPts val="1900"/>
-              <a:buChar char="●"/>
-            </a:pPr>
-            <a:r>
-              <a:rPr lang="en" sz="1900"/>
-              <a:t>Compares it to the </a:t>
-            </a:r>
-            <a:r>
-              <a:rPr lang="en" sz="1900"/>
-              <a:t>stored</a:t>
-            </a:r>
-            <a:r>
-              <a:rPr lang="en" sz="1900"/>
-              <a:t> data to make sure it matches</a:t>
-            </a:r>
-            <a:endParaRPr sz="1900"/>
-          </a:p>
-        </p:txBody>
-      </p:sp>
-      <p:sp>
-        <p:nvSpPr>
-          <p:cNvPr id="334" name="Google Shape;334;p38"/>
           <p:cNvSpPr txBox="1"/>
           <p:nvPr>
             <p:ph idx="12" type="sldNum"/>
@@ -15768,7 +15656,7 @@
   <p:cSld>
     <p:spTree>
       <p:nvGrpSpPr>
-        <p:cNvPr id="338" name="Shape 338"/>
+        <p:cNvPr id="337" name="Shape 337"/>
         <p:cNvGrpSpPr/>
         <p:nvPr/>
       </p:nvGrpSpPr>
@@ -15782,7 +15670,7 @@
       </p:grpSpPr>
       <p:sp>
         <p:nvSpPr>
-          <p:cNvPr id="339" name="Google Shape;339;p39"/>
+          <p:cNvPr id="338" name="Google Shape;338;p39"/>
           <p:cNvSpPr txBox="1"/>
           <p:nvPr>
             <p:ph type="title"/>
@@ -15814,9 +15702,49 @@
             </a:pPr>
             <a:r>
               <a:rPr lang="en"/>
-              <a:t>MD5 Hashing cont’d</a:t>
+              <a:t>Pushing to GitHub</a:t>
             </a:r>
             <a:endParaRPr/>
+          </a:p>
+        </p:txBody>
+      </p:sp>
+      <p:sp>
+        <p:nvSpPr>
+          <p:cNvPr id="339" name="Google Shape;339;p39"/>
+          <p:cNvSpPr txBox="1"/>
+          <p:nvPr>
+            <p:ph idx="1" type="body"/>
+          </p:nvPr>
+        </p:nvSpPr>
+        <p:spPr>
+          <a:xfrm>
+            <a:off x="1297500" y="1123850"/>
+            <a:ext cx="7038900" cy="1004100"/>
+          </a:xfrm>
+          <a:prstGeom prst="rect">
+            <a:avLst/>
+          </a:prstGeom>
+        </p:spPr>
+        <p:txBody>
+          <a:bodyPr anchorCtr="0" anchor="t" bIns="91425" lIns="91425" spcFirstLastPara="1" rIns="91425" wrap="square" tIns="91425">
+            <a:normAutofit/>
+          </a:bodyPr>
+          <a:lstStyle/>
+          <a:p>
+            <a:pPr indent="0" lvl="0" marL="0" rtl="0" algn="l">
+              <a:spcBef>
+                <a:spcPts val="0"/>
+              </a:spcBef>
+              <a:spcAft>
+                <a:spcPts val="1200"/>
+              </a:spcAft>
+              <a:buNone/>
+            </a:pPr>
+            <a:r>
+              <a:rPr lang="en" sz="1900"/>
+              <a:t>During the course of our project, we used GitHub to collaborate on the code and divide the work. </a:t>
+            </a:r>
+            <a:endParaRPr sz="1900"/>
           </a:p>
         </p:txBody>
       </p:sp>
@@ -15836,8 +15764,8 @@
         </p:blipFill>
         <p:spPr>
           <a:xfrm>
-            <a:off x="2226600" y="1251325"/>
-            <a:ext cx="5180705" cy="3530850"/>
+            <a:off x="2653075" y="1977350"/>
+            <a:ext cx="3837852" cy="2919224"/>
           </a:xfrm>
           <a:prstGeom prst="rect">
             <a:avLst/>
@@ -15947,179 +15875,6 @@
             </a:pPr>
             <a:r>
               <a:rPr lang="en"/>
-              <a:t>Pushing to GitHub</a:t>
-            </a:r>
-            <a:endParaRPr/>
-          </a:p>
-        </p:txBody>
-      </p:sp>
-      <p:sp>
-        <p:nvSpPr>
-          <p:cNvPr id="347" name="Google Shape;347;p40"/>
-          <p:cNvSpPr txBox="1"/>
-          <p:nvPr>
-            <p:ph idx="1" type="body"/>
-          </p:nvPr>
-        </p:nvSpPr>
-        <p:spPr>
-          <a:xfrm>
-            <a:off x="1297500" y="1123850"/>
-            <a:ext cx="7038900" cy="1004100"/>
-          </a:xfrm>
-          <a:prstGeom prst="rect">
-            <a:avLst/>
-          </a:prstGeom>
-        </p:spPr>
-        <p:txBody>
-          <a:bodyPr anchorCtr="0" anchor="t" bIns="91425" lIns="91425" spcFirstLastPara="1" rIns="91425" wrap="square" tIns="91425">
-            <a:normAutofit/>
-          </a:bodyPr>
-          <a:lstStyle/>
-          <a:p>
-            <a:pPr indent="0" lvl="0" marL="0" rtl="0" algn="l">
-              <a:spcBef>
-                <a:spcPts val="0"/>
-              </a:spcBef>
-              <a:spcAft>
-                <a:spcPts val="1200"/>
-              </a:spcAft>
-              <a:buNone/>
-            </a:pPr>
-            <a:r>
-              <a:rPr lang="en" sz="1900"/>
-              <a:t>During the course of our project, we used GitHub to collaborate on the code and divide the work. </a:t>
-            </a:r>
-            <a:endParaRPr sz="1900"/>
-          </a:p>
-        </p:txBody>
-      </p:sp>
-      <p:pic>
-        <p:nvPicPr>
-          <p:cNvPr id="348" name="Google Shape;348;p40"/>
-          <p:cNvPicPr preferRelativeResize="0"/>
-          <p:nvPr/>
-        </p:nvPicPr>
-        <p:blipFill>
-          <a:blip r:embed="rId3">
-            <a:alphaModFix/>
-          </a:blip>
-          <a:stretch>
-            <a:fillRect/>
-          </a:stretch>
-        </p:blipFill>
-        <p:spPr>
-          <a:xfrm>
-            <a:off x="2653075" y="1977350"/>
-            <a:ext cx="3837852" cy="2919224"/>
-          </a:xfrm>
-          <a:prstGeom prst="rect">
-            <a:avLst/>
-          </a:prstGeom>
-          <a:noFill/>
-          <a:ln>
-            <a:noFill/>
-          </a:ln>
-        </p:spPr>
-      </p:pic>
-      <p:sp>
-        <p:nvSpPr>
-          <p:cNvPr id="349" name="Google Shape;349;p40"/>
-          <p:cNvSpPr txBox="1"/>
-          <p:nvPr>
-            <p:ph idx="12" type="sldNum"/>
-          </p:nvPr>
-        </p:nvSpPr>
-        <p:spPr>
-          <a:xfrm>
-            <a:off x="8472458" y="4663217"/>
-            <a:ext cx="548700" cy="393600"/>
-          </a:xfrm>
-          <a:prstGeom prst="rect">
-            <a:avLst/>
-          </a:prstGeom>
-        </p:spPr>
-        <p:txBody>
-          <a:bodyPr anchorCtr="0" anchor="ctr" bIns="91425" lIns="91425" spcFirstLastPara="1" rIns="91425" wrap="square" tIns="91425">
-            <a:normAutofit/>
-          </a:bodyPr>
-          <a:lstStyle/>
-          <a:p>
-            <a:pPr indent="0" lvl="0" marL="0" rtl="0" algn="r">
-              <a:spcBef>
-                <a:spcPts val="0"/>
-              </a:spcBef>
-              <a:spcAft>
-                <a:spcPts val="0"/>
-              </a:spcAft>
-              <a:buNone/>
-            </a:pPr>
-            <a:fld id="{00000000-1234-1234-1234-123412341234}" type="slidenum">
-              <a:rPr lang="en"/>
-              <a:t>‹#›</a:t>
-            </a:fld>
-            <a:endParaRPr/>
-          </a:p>
-        </p:txBody>
-      </p:sp>
-    </p:spTree>
-  </p:cSld>
-  <p:clrMapOvr>
-    <a:masterClrMapping/>
-  </p:clrMapOvr>
-</p:sld>
-</file>
-
-<file path=ppt/slides/slide29.xml><?xml version="1.0" encoding="utf-8"?>
-<p:sld xmlns:a="http://schemas.openxmlformats.org/drawingml/2006/main" xmlns:r="http://schemas.openxmlformats.org/officeDocument/2006/relationships" xmlns:mc="http://schemas.openxmlformats.org/markup-compatibility/2006" xmlns:mv="urn:schemas-microsoft-com:mac:vml" xmlns:p="http://schemas.openxmlformats.org/presentationml/2006/main" xmlns:c="http://schemas.openxmlformats.org/drawingml/2006/chart" xmlns:dgm="http://schemas.openxmlformats.org/drawingml/2006/diagram" xmlns:o="urn:schemas-microsoft-com:office:office" xmlns:v="urn:schemas-microsoft-com:vml" xmlns:pvml="urn:schemas-microsoft-com:office:powerpoint" xmlns:com="http://schemas.openxmlformats.org/drawingml/2006/compatibility" xmlns:p14="http://schemas.microsoft.com/office/powerpoint/2010/main" xmlns:p15="http://schemas.microsoft.com/office/powerpoint/2012/main" xmlns:ahyp="http://schemas.microsoft.com/office/drawing/2018/hyperlinkcolor">
-  <p:cSld>
-    <p:spTree>
-      <p:nvGrpSpPr>
-        <p:cNvPr id="353" name="Shape 353"/>
-        <p:cNvGrpSpPr/>
-        <p:nvPr/>
-      </p:nvGrpSpPr>
-      <p:grpSpPr>
-        <a:xfrm>
-          <a:off x="0" y="0"/>
-          <a:ext cx="0" cy="0"/>
-          <a:chOff x="0" y="0"/>
-          <a:chExt cx="0" cy="0"/>
-        </a:xfrm>
-      </p:grpSpPr>
-      <p:sp>
-        <p:nvSpPr>
-          <p:cNvPr id="354" name="Google Shape;354;p41"/>
-          <p:cNvSpPr txBox="1"/>
-          <p:nvPr>
-            <p:ph type="title"/>
-          </p:nvPr>
-        </p:nvSpPr>
-        <p:spPr>
-          <a:xfrm>
-            <a:off x="1297500" y="393750"/>
-            <a:ext cx="7038900" cy="914100"/>
-          </a:xfrm>
-          <a:prstGeom prst="rect">
-            <a:avLst/>
-          </a:prstGeom>
-        </p:spPr>
-        <p:txBody>
-          <a:bodyPr anchorCtr="0" anchor="t" bIns="91425" lIns="91425" spcFirstLastPara="1" rIns="91425" wrap="square" tIns="91425">
-            <a:normAutofit/>
-          </a:bodyPr>
-          <a:lstStyle/>
-          <a:p>
-            <a:pPr indent="0" lvl="0" marL="0" rtl="0" algn="l">
-              <a:spcBef>
-                <a:spcPts val="0"/>
-              </a:spcBef>
-              <a:spcAft>
-                <a:spcPts val="0"/>
-              </a:spcAft>
-              <a:buNone/>
-            </a:pPr>
-            <a:r>
-              <a:rPr lang="en"/>
               <a:t>Demo</a:t>
             </a:r>
             <a:endParaRPr/>
@@ -16128,7 +15883,7 @@
       </p:sp>
       <p:pic>
         <p:nvPicPr>
-          <p:cNvPr descr="ITS TIME FOR THE EPIC DEMO" id="355" name="Google Shape;355;p41" title="EPIC DEMO TIME">
+          <p:cNvPr descr="ITS TIME FOR THE EPIC DEMO" id="347" name="Google Shape;347;p40" title="EPIC DEMO TIME">
             <a:hlinkClick r:id="rId3"/>
           </p:cNvPr>
           <p:cNvPicPr preferRelativeResize="0"/>
@@ -16165,7 +15920,7 @@
       </p:pic>
       <p:sp>
         <p:nvSpPr>
-          <p:cNvPr id="356" name="Google Shape;356;p41"/>
+          <p:cNvPr id="348" name="Google Shape;348;p40"/>
           <p:cNvSpPr txBox="1"/>
           <p:nvPr>
             <p:ph idx="12" type="sldNum"/>
@@ -16245,7 +16000,7 @@
                                           </p:stCondLst>
                                         </p:cTn>
                                         <p:tgtEl>
-                                          <p:spTgt spid="355"/>
+                                          <p:spTgt spid="347"/>
                                         </p:tgtEl>
                                         <p:attrNameLst>
                                           <p:attrName>style.visibility</p:attrName>
@@ -16259,7 +16014,7 @@
                                       <p:cBhvr>
                                         <p:cTn dur="1000"/>
                                         <p:tgtEl>
-                                          <p:spTgt spid="355"/>
+                                          <p:spTgt spid="347"/>
                                         </p:tgtEl>
                                       </p:cBhvr>
                                     </p:animEffect>
@@ -16297,6 +16052,112 @@
 </p:sld>
 </file>
 
+<file path=ppt/slides/slide29.xml><?xml version="1.0" encoding="utf-8"?>
+<p:sld xmlns:a="http://schemas.openxmlformats.org/drawingml/2006/main" xmlns:r="http://schemas.openxmlformats.org/officeDocument/2006/relationships" xmlns:mc="http://schemas.openxmlformats.org/markup-compatibility/2006" xmlns:mv="urn:schemas-microsoft-com:mac:vml" xmlns:p="http://schemas.openxmlformats.org/presentationml/2006/main" xmlns:c="http://schemas.openxmlformats.org/drawingml/2006/chart" xmlns:dgm="http://schemas.openxmlformats.org/drawingml/2006/diagram" xmlns:o="urn:schemas-microsoft-com:office:office" xmlns:v="urn:schemas-microsoft-com:vml" xmlns:pvml="urn:schemas-microsoft-com:office:powerpoint" xmlns:com="http://schemas.openxmlformats.org/drawingml/2006/compatibility" xmlns:p14="http://schemas.microsoft.com/office/powerpoint/2010/main" xmlns:p15="http://schemas.microsoft.com/office/powerpoint/2012/main" xmlns:ahyp="http://schemas.microsoft.com/office/drawing/2018/hyperlinkcolor">
+  <p:cSld>
+    <p:spTree>
+      <p:nvGrpSpPr>
+        <p:cNvPr id="352" name="Shape 352"/>
+        <p:cNvGrpSpPr/>
+        <p:nvPr/>
+      </p:nvGrpSpPr>
+      <p:grpSpPr>
+        <a:xfrm>
+          <a:off x="0" y="0"/>
+          <a:ext cx="0" cy="0"/>
+          <a:chOff x="0" y="0"/>
+          <a:chExt cx="0" cy="0"/>
+        </a:xfrm>
+      </p:grpSpPr>
+      <p:sp>
+        <p:nvSpPr>
+          <p:cNvPr id="353" name="Google Shape;353;p41"/>
+          <p:cNvSpPr txBox="1"/>
+          <p:nvPr>
+            <p:ph type="title"/>
+          </p:nvPr>
+        </p:nvSpPr>
+        <p:spPr>
+          <a:xfrm>
+            <a:off x="311700" y="1999050"/>
+            <a:ext cx="8520600" cy="572700"/>
+          </a:xfrm>
+          <a:prstGeom prst="rect">
+            <a:avLst/>
+          </a:prstGeom>
+        </p:spPr>
+        <p:txBody>
+          <a:bodyPr anchorCtr="0" anchor="t" bIns="91425" lIns="91425" spcFirstLastPara="1" rIns="91425" wrap="square" tIns="91425">
+            <a:noAutofit/>
+          </a:bodyPr>
+          <a:lstStyle/>
+          <a:p>
+            <a:pPr indent="0" lvl="0" marL="0" rtl="0" algn="ctr">
+              <a:spcBef>
+                <a:spcPts val="0"/>
+              </a:spcBef>
+              <a:spcAft>
+                <a:spcPts val="0"/>
+              </a:spcAft>
+              <a:buSzPts val="990"/>
+              <a:buNone/>
+            </a:pPr>
+            <a:r>
+              <a:rPr lang="en" sz="4020"/>
+              <a:t>Questions?</a:t>
+            </a:r>
+            <a:endParaRPr sz="4020"/>
+          </a:p>
+        </p:txBody>
+      </p:sp>
+      <p:sp>
+        <p:nvSpPr>
+          <p:cNvPr id="354" name="Google Shape;354;p41"/>
+          <p:cNvSpPr txBox="1"/>
+          <p:nvPr>
+            <p:ph idx="12" type="sldNum"/>
+          </p:nvPr>
+        </p:nvSpPr>
+        <p:spPr>
+          <a:xfrm>
+            <a:off x="8472458" y="4663217"/>
+            <a:ext cx="548700" cy="393600"/>
+          </a:xfrm>
+          <a:prstGeom prst="rect">
+            <a:avLst/>
+          </a:prstGeom>
+        </p:spPr>
+        <p:txBody>
+          <a:bodyPr anchorCtr="0" anchor="ctr" bIns="91425" lIns="91425" spcFirstLastPara="1" rIns="91425" wrap="square" tIns="91425">
+            <a:normAutofit/>
+          </a:bodyPr>
+          <a:lstStyle/>
+          <a:p>
+            <a:pPr indent="0" lvl="0" marL="0" rtl="0" algn="r">
+              <a:spcBef>
+                <a:spcPts val="0"/>
+              </a:spcBef>
+              <a:spcAft>
+                <a:spcPts val="0"/>
+              </a:spcAft>
+              <a:buNone/>
+            </a:pPr>
+            <a:fld id="{00000000-1234-1234-1234-123412341234}" type="slidenum">
+              <a:rPr lang="en"/>
+              <a:t>‹#›</a:t>
+            </a:fld>
+            <a:endParaRPr/>
+          </a:p>
+        </p:txBody>
+      </p:sp>
+    </p:spTree>
+  </p:cSld>
+  <p:clrMapOvr>
+    <a:masterClrMapping/>
+  </p:clrMapOvr>
+</p:sld>
+</file>
+
 <file path=ppt/slides/slide3.xml><?xml version="1.0" encoding="utf-8"?>
 <p:sld xmlns:a="http://schemas.openxmlformats.org/drawingml/2006/main" xmlns:r="http://schemas.openxmlformats.org/officeDocument/2006/relationships" xmlns:mc="http://schemas.openxmlformats.org/markup-compatibility/2006" xmlns:mv="urn:schemas-microsoft-com:mac:vml" xmlns:p="http://schemas.openxmlformats.org/presentationml/2006/main" xmlns:c="http://schemas.openxmlformats.org/drawingml/2006/chart" xmlns:dgm="http://schemas.openxmlformats.org/drawingml/2006/diagram" xmlns:o="urn:schemas-microsoft-com:office:office" xmlns:v="urn:schemas-microsoft-com:vml" xmlns:pvml="urn:schemas-microsoft-com:office:powerpoint" xmlns:com="http://schemas.openxmlformats.org/drawingml/2006/compatibility" xmlns:p14="http://schemas.microsoft.com/office/powerpoint/2010/main" xmlns:p15="http://schemas.microsoft.com/office/powerpoint/2012/main" xmlns:ahyp="http://schemas.microsoft.com/office/drawing/2018/hyperlinkcolor">
   <p:cSld>
@@ -16490,7 +16351,7 @@
   <p:cSld>
     <p:spTree>
       <p:nvGrpSpPr>
-        <p:cNvPr id="360" name="Shape 360"/>
+        <p:cNvPr id="358" name="Shape 358"/>
         <p:cNvGrpSpPr/>
         <p:nvPr/>
       </p:nvGrpSpPr>
@@ -16504,113 +16365,7 @@
       </p:grpSpPr>
       <p:sp>
         <p:nvSpPr>
-          <p:cNvPr id="361" name="Google Shape;361;p42"/>
-          <p:cNvSpPr txBox="1"/>
-          <p:nvPr>
-            <p:ph type="title"/>
-          </p:nvPr>
-        </p:nvSpPr>
-        <p:spPr>
-          <a:xfrm>
-            <a:off x="311700" y="1999050"/>
-            <a:ext cx="8520600" cy="572700"/>
-          </a:xfrm>
-          <a:prstGeom prst="rect">
-            <a:avLst/>
-          </a:prstGeom>
-        </p:spPr>
-        <p:txBody>
-          <a:bodyPr anchorCtr="0" anchor="t" bIns="91425" lIns="91425" spcFirstLastPara="1" rIns="91425" wrap="square" tIns="91425">
-            <a:noAutofit/>
-          </a:bodyPr>
-          <a:lstStyle/>
-          <a:p>
-            <a:pPr indent="0" lvl="0" marL="0" rtl="0" algn="ctr">
-              <a:spcBef>
-                <a:spcPts val="0"/>
-              </a:spcBef>
-              <a:spcAft>
-                <a:spcPts val="0"/>
-              </a:spcAft>
-              <a:buSzPts val="990"/>
-              <a:buNone/>
-            </a:pPr>
-            <a:r>
-              <a:rPr lang="en" sz="4020"/>
-              <a:t>Questions?</a:t>
-            </a:r>
-            <a:endParaRPr sz="4020"/>
-          </a:p>
-        </p:txBody>
-      </p:sp>
-      <p:sp>
-        <p:nvSpPr>
-          <p:cNvPr id="362" name="Google Shape;362;p42"/>
-          <p:cNvSpPr txBox="1"/>
-          <p:nvPr>
-            <p:ph idx="12" type="sldNum"/>
-          </p:nvPr>
-        </p:nvSpPr>
-        <p:spPr>
-          <a:xfrm>
-            <a:off x="8472458" y="4663217"/>
-            <a:ext cx="548700" cy="393600"/>
-          </a:xfrm>
-          <a:prstGeom prst="rect">
-            <a:avLst/>
-          </a:prstGeom>
-        </p:spPr>
-        <p:txBody>
-          <a:bodyPr anchorCtr="0" anchor="ctr" bIns="91425" lIns="91425" spcFirstLastPara="1" rIns="91425" wrap="square" tIns="91425">
-            <a:normAutofit/>
-          </a:bodyPr>
-          <a:lstStyle/>
-          <a:p>
-            <a:pPr indent="0" lvl="0" marL="0" rtl="0" algn="r">
-              <a:spcBef>
-                <a:spcPts val="0"/>
-              </a:spcBef>
-              <a:spcAft>
-                <a:spcPts val="0"/>
-              </a:spcAft>
-              <a:buNone/>
-            </a:pPr>
-            <a:fld id="{00000000-1234-1234-1234-123412341234}" type="slidenum">
-              <a:rPr lang="en"/>
-              <a:t>‹#›</a:t>
-            </a:fld>
-            <a:endParaRPr/>
-          </a:p>
-        </p:txBody>
-      </p:sp>
-    </p:spTree>
-  </p:cSld>
-  <p:clrMapOvr>
-    <a:masterClrMapping/>
-  </p:clrMapOvr>
-</p:sld>
-</file>
-
-<file path=ppt/slides/slide31.xml><?xml version="1.0" encoding="utf-8"?>
-<p:sld xmlns:a="http://schemas.openxmlformats.org/drawingml/2006/main" xmlns:r="http://schemas.openxmlformats.org/officeDocument/2006/relationships" xmlns:mc="http://schemas.openxmlformats.org/markup-compatibility/2006" xmlns:mv="urn:schemas-microsoft-com:mac:vml" xmlns:p="http://schemas.openxmlformats.org/presentationml/2006/main" xmlns:c="http://schemas.openxmlformats.org/drawingml/2006/chart" xmlns:dgm="http://schemas.openxmlformats.org/drawingml/2006/diagram" xmlns:o="urn:schemas-microsoft-com:office:office" xmlns:v="urn:schemas-microsoft-com:vml" xmlns:pvml="urn:schemas-microsoft-com:office:powerpoint" xmlns:com="http://schemas.openxmlformats.org/drawingml/2006/compatibility" xmlns:p14="http://schemas.microsoft.com/office/powerpoint/2010/main" xmlns:p15="http://schemas.microsoft.com/office/powerpoint/2012/main" xmlns:ahyp="http://schemas.microsoft.com/office/drawing/2018/hyperlinkcolor">
-  <p:cSld>
-    <p:spTree>
-      <p:nvGrpSpPr>
-        <p:cNvPr id="366" name="Shape 366"/>
-        <p:cNvGrpSpPr/>
-        <p:nvPr/>
-      </p:nvGrpSpPr>
-      <p:grpSpPr>
-        <a:xfrm>
-          <a:off x="0" y="0"/>
-          <a:ext cx="0" cy="0"/>
-          <a:chOff x="0" y="0"/>
-          <a:chExt cx="0" cy="0"/>
-        </a:xfrm>
-      </p:grpSpPr>
-      <p:sp>
-        <p:nvSpPr>
-          <p:cNvPr id="367" name="Google Shape;367;p43"/>
+          <p:cNvPr id="359" name="Google Shape;359;p42"/>
           <p:cNvSpPr txBox="1"/>
           <p:nvPr>
             <p:ph type="title"/>
@@ -16650,7 +16405,7 @@
       </p:sp>
       <p:sp>
         <p:nvSpPr>
-          <p:cNvPr id="368" name="Google Shape;368;p43"/>
+          <p:cNvPr id="360" name="Google Shape;360;p42"/>
           <p:cNvSpPr txBox="1"/>
           <p:nvPr>
             <p:ph idx="1" type="body"/>
@@ -16796,7 +16551,7 @@
       </p:sp>
       <p:sp>
         <p:nvSpPr>
-          <p:cNvPr id="369" name="Google Shape;369;p43"/>
+          <p:cNvPr id="361" name="Google Shape;361;p42"/>
           <p:cNvSpPr txBox="1"/>
           <p:nvPr>
             <p:ph idx="12" type="sldNum"/>
@@ -18364,6 +18119,285 @@
 </file>
 
 <file path=ppt/theme/theme1.xml><?xml version="1.0" encoding="utf-8"?>
+<a:theme xmlns:a="http://schemas.openxmlformats.org/drawingml/2006/main" xmlns:r="http://schemas.openxmlformats.org/officeDocument/2006/relationships" name="Focus">
+  <a:themeElements>
+    <a:clrScheme name="Focus">
+      <a:dk1>
+        <a:srgbClr val="1B212C"/>
+      </a:dk1>
+      <a:lt1>
+        <a:srgbClr val="FFFFFF"/>
+      </a:lt1>
+      <a:dk2>
+        <a:srgbClr val="D9D9D9"/>
+      </a:dk2>
+      <a:lt2>
+        <a:srgbClr val="82C7A5"/>
+      </a:lt2>
+      <a:accent1>
+        <a:srgbClr val="0145AC"/>
+      </a:accent1>
+      <a:accent2>
+        <a:srgbClr val="EECE1A"/>
+      </a:accent2>
+      <a:accent3>
+        <a:srgbClr val="4E5567"/>
+      </a:accent3>
+      <a:accent4>
+        <a:srgbClr val="F4D6AD"/>
+      </a:accent4>
+      <a:accent5>
+        <a:srgbClr val="7890CD"/>
+      </a:accent5>
+      <a:accent6>
+        <a:srgbClr val="F15E22"/>
+      </a:accent6>
+      <a:hlink>
+        <a:srgbClr val="7890CD"/>
+      </a:hlink>
+      <a:folHlink>
+        <a:srgbClr val="7890CD"/>
+      </a:folHlink>
+    </a:clrScheme>
+    <a:fontScheme name="Office">
+      <a:majorFont>
+        <a:latin typeface="Arial"/>
+        <a:ea typeface=""/>
+        <a:cs typeface=""/>
+        <a:font script="Jpan" typeface="ＭＳ Ｐゴシック"/>
+        <a:font script="Hang" typeface="맑은 고딕"/>
+        <a:font script="Hans" typeface="宋体"/>
+        <a:font script="Hant" typeface="新細明體"/>
+        <a:font script="Arab" typeface="Times New Roman"/>
+        <a:font script="Hebr" typeface="Times New Roman"/>
+        <a:font script="Thai" typeface="Angsana New"/>
+        <a:font script="Ethi" typeface="Nyala"/>
+        <a:font script="Beng" typeface="Vrinda"/>
+        <a:font script="Gujr" typeface="Shruti"/>
+        <a:font script="Khmr" typeface="MoolBoran"/>
+        <a:font script="Knda" typeface="Tunga"/>
+        <a:font script="Guru" typeface="Raavi"/>
+        <a:font script="Cans" typeface="Euphemia"/>
+        <a:font script="Cher" typeface="Plantagenet Cherokee"/>
+        <a:font script="Yiii" typeface="Microsoft Yi Baiti"/>
+        <a:font script="Tibt" typeface="Microsoft Himalaya"/>
+        <a:font script="Thaa" typeface="MV Boli"/>
+        <a:font script="Deva" typeface="Mangal"/>
+        <a:font script="Telu" typeface="Gautami"/>
+        <a:font script="Taml" typeface="Latha"/>
+        <a:font script="Syrc" typeface="Estrangelo Edessa"/>
+        <a:font script="Orya" typeface="Kalinga"/>
+        <a:font script="Mlym" typeface="Kartika"/>
+        <a:font script="Laoo" typeface="DokChampa"/>
+        <a:font script="Sinh" typeface="Iskoola Pota"/>
+        <a:font script="Mong" typeface="Mongolian Baiti"/>
+        <a:font script="Viet" typeface="Times New Roman"/>
+        <a:font script="Uigh" typeface="Microsoft Uighur"/>
+        <a:font script="Geor" typeface="Sylfaen"/>
+      </a:majorFont>
+      <a:minorFont>
+        <a:latin typeface="Arial"/>
+        <a:ea typeface=""/>
+        <a:cs typeface=""/>
+        <a:font script="Jpan" typeface="ＭＳ Ｐゴシック"/>
+        <a:font script="Hang" typeface="맑은 고딕"/>
+        <a:font script="Hans" typeface="宋体"/>
+        <a:font script="Hant" typeface="新細明體"/>
+        <a:font script="Arab" typeface="Arial"/>
+        <a:font script="Hebr" typeface="Arial"/>
+        <a:font script="Thai" typeface="Cordia New"/>
+        <a:font script="Ethi" typeface="Nyala"/>
+        <a:font script="Beng" typeface="Vrinda"/>
+        <a:font script="Gujr" typeface="Shruti"/>
+        <a:font script="Khmr" typeface="DaunPenh"/>
+        <a:font script="Knda" typeface="Tunga"/>
+        <a:font script="Guru" typeface="Raavi"/>
+        <a:font script="Cans" typeface="Euphemia"/>
+        <a:font script="Cher" typeface="Plantagenet Cherokee"/>
+        <a:font script="Yiii" typeface="Microsoft Yi Baiti"/>
+        <a:font script="Tibt" typeface="Microsoft Himalaya"/>
+        <a:font script="Thaa" typeface="MV Boli"/>
+        <a:font script="Deva" typeface="Mangal"/>
+        <a:font script="Telu" typeface="Gautami"/>
+        <a:font script="Taml" typeface="Latha"/>
+        <a:font script="Syrc" typeface="Estrangelo Edessa"/>
+        <a:font script="Orya" typeface="Kalinga"/>
+        <a:font script="Mlym" typeface="Kartika"/>
+        <a:font script="Laoo" typeface="DokChampa"/>
+        <a:font script="Sinh" typeface="Iskoola Pota"/>
+        <a:font script="Mong" typeface="Mongolian Baiti"/>
+        <a:font script="Viet" typeface="Arial"/>
+        <a:font script="Uigh" typeface="Microsoft Uighur"/>
+        <a:font script="Geor" typeface="Sylfaen"/>
+      </a:minorFont>
+    </a:fontScheme>
+    <a:fmtScheme name="Office">
+      <a:fillStyleLst>
+        <a:solidFill>
+          <a:schemeClr val="phClr"/>
+        </a:solidFill>
+        <a:gradFill rotWithShape="1">
+          <a:gsLst>
+            <a:gs pos="0">
+              <a:schemeClr val="phClr">
+                <a:tint val="50000"/>
+                <a:satMod val="300000"/>
+              </a:schemeClr>
+            </a:gs>
+            <a:gs pos="35000">
+              <a:schemeClr val="phClr">
+                <a:tint val="37000"/>
+                <a:satMod val="300000"/>
+              </a:schemeClr>
+            </a:gs>
+            <a:gs pos="100000">
+              <a:schemeClr val="phClr">
+                <a:tint val="15000"/>
+                <a:satMod val="350000"/>
+              </a:schemeClr>
+            </a:gs>
+          </a:gsLst>
+          <a:lin ang="16200000" scaled="1"/>
+        </a:gradFill>
+        <a:gradFill rotWithShape="1">
+          <a:gsLst>
+            <a:gs pos="0">
+              <a:schemeClr val="phClr">
+                <a:tint val="100000"/>
+                <a:shade val="100000"/>
+                <a:satMod val="130000"/>
+              </a:schemeClr>
+            </a:gs>
+            <a:gs pos="100000">
+              <a:schemeClr val="phClr">
+                <a:tint val="50000"/>
+                <a:shade val="100000"/>
+                <a:satMod val="350000"/>
+              </a:schemeClr>
+            </a:gs>
+          </a:gsLst>
+          <a:lin ang="16200000" scaled="0"/>
+        </a:gradFill>
+      </a:fillStyleLst>
+      <a:lnStyleLst>
+        <a:ln w="9525" cap="flat" cmpd="sng" algn="ctr">
+          <a:solidFill>
+            <a:schemeClr val="phClr">
+              <a:shade val="95000"/>
+              <a:satMod val="105000"/>
+            </a:schemeClr>
+          </a:solidFill>
+          <a:prstDash val="solid"/>
+        </a:ln>
+        <a:ln w="25400" cap="flat" cmpd="sng" algn="ctr">
+          <a:solidFill>
+            <a:schemeClr val="phClr"/>
+          </a:solidFill>
+          <a:prstDash val="solid"/>
+        </a:ln>
+        <a:ln w="38100" cap="flat" cmpd="sng" algn="ctr">
+          <a:solidFill>
+            <a:schemeClr val="phClr"/>
+          </a:solidFill>
+          <a:prstDash val="solid"/>
+        </a:ln>
+      </a:lnStyleLst>
+      <a:effectStyleLst>
+        <a:effectStyle>
+          <a:effectLst>
+            <a:outerShdw blurRad="40000" dist="20000" dir="5400000" rotWithShape="0">
+              <a:srgbClr val="000000">
+                <a:alpha val="38000"/>
+              </a:srgbClr>
+            </a:outerShdw>
+          </a:effectLst>
+        </a:effectStyle>
+        <a:effectStyle>
+          <a:effectLst>
+            <a:outerShdw blurRad="40000" dist="23000" dir="5400000" rotWithShape="0">
+              <a:srgbClr val="000000">
+                <a:alpha val="35000"/>
+              </a:srgbClr>
+            </a:outerShdw>
+          </a:effectLst>
+        </a:effectStyle>
+        <a:effectStyle>
+          <a:effectLst>
+            <a:outerShdw blurRad="40000" dist="23000" dir="5400000" rotWithShape="0">
+              <a:srgbClr val="000000">
+                <a:alpha val="35000"/>
+              </a:srgbClr>
+            </a:outerShdw>
+          </a:effectLst>
+          <a:scene3d>
+            <a:camera prst="orthographicFront">
+              <a:rot lat="0" lon="0" rev="0"/>
+            </a:camera>
+            <a:lightRig rig="threePt" dir="t">
+              <a:rot lat="0" lon="0" rev="1200000"/>
+            </a:lightRig>
+          </a:scene3d>
+          <a:sp3d>
+            <a:bevelT w="63500" h="25400"/>
+          </a:sp3d>
+        </a:effectStyle>
+      </a:effectStyleLst>
+      <a:bgFillStyleLst>
+        <a:solidFill>
+          <a:schemeClr val="phClr"/>
+        </a:solidFill>
+        <a:gradFill rotWithShape="1">
+          <a:gsLst>
+            <a:gs pos="0">
+              <a:schemeClr val="phClr">
+                <a:tint val="40000"/>
+                <a:satMod val="350000"/>
+              </a:schemeClr>
+            </a:gs>
+            <a:gs pos="40000">
+              <a:schemeClr val="phClr">
+                <a:tint val="45000"/>
+                <a:shade val="99000"/>
+                <a:satMod val="350000"/>
+              </a:schemeClr>
+            </a:gs>
+            <a:gs pos="100000">
+              <a:schemeClr val="phClr">
+                <a:shade val="20000"/>
+                <a:satMod val="255000"/>
+              </a:schemeClr>
+            </a:gs>
+          </a:gsLst>
+          <a:path path="circle">
+            <a:fillToRect l="50000" t="-80000" r="50000" b="180000"/>
+          </a:path>
+        </a:gradFill>
+        <a:gradFill rotWithShape="1">
+          <a:gsLst>
+            <a:gs pos="0">
+              <a:schemeClr val="phClr">
+                <a:tint val="80000"/>
+                <a:satMod val="300000"/>
+              </a:schemeClr>
+            </a:gs>
+            <a:gs pos="100000">
+              <a:schemeClr val="phClr">
+                <a:shade val="30000"/>
+                <a:satMod val="200000"/>
+              </a:schemeClr>
+            </a:gs>
+          </a:gsLst>
+          <a:path path="circle">
+            <a:fillToRect l="50000" t="50000" r="50000" b="50000"/>
+          </a:path>
+        </a:gradFill>
+      </a:bgFillStyleLst>
+    </a:fmtScheme>
+  </a:themeElements>
+</a:theme>
+</file>
+
+<file path=ppt/theme/theme2.xml><?xml version="1.0" encoding="utf-8"?>
 <a:theme xmlns:a="http://schemas.openxmlformats.org/drawingml/2006/main" xmlns:r="http://schemas.openxmlformats.org/officeDocument/2006/relationships">
   <a:themeElements>
     <a:clrScheme name="Default">
@@ -18640,283 +18674,4 @@
     </a:fmtScheme>
   </a:themeElements>
 </a:theme>
-</file>
-
-<file path=ppt/theme/theme2.xml><?xml version="1.0" encoding="utf-8"?>
-<a:theme xmlns:a="http://schemas.openxmlformats.org/drawingml/2006/main" xmlns:r="http://schemas.openxmlformats.org/officeDocument/2006/relationships" name="Focus">
-  <a:themeElements>
-    <a:clrScheme name="Focus">
-      <a:dk1>
-        <a:srgbClr val="1B212C"/>
-      </a:dk1>
-      <a:lt1>
-        <a:srgbClr val="FFFFFF"/>
-      </a:lt1>
-      <a:dk2>
-        <a:srgbClr val="D9D9D9"/>
-      </a:dk2>
-      <a:lt2>
-        <a:srgbClr val="82C7A5"/>
-      </a:lt2>
-      <a:accent1>
-        <a:srgbClr val="0145AC"/>
-      </a:accent1>
-      <a:accent2>
-        <a:srgbClr val="EECE1A"/>
-      </a:accent2>
-      <a:accent3>
-        <a:srgbClr val="4E5567"/>
-      </a:accent3>
-      <a:accent4>
-        <a:srgbClr val="F4D6AD"/>
-      </a:accent4>
-      <a:accent5>
-        <a:srgbClr val="7890CD"/>
-      </a:accent5>
-      <a:accent6>
-        <a:srgbClr val="F15E22"/>
-      </a:accent6>
-      <a:hlink>
-        <a:srgbClr val="7890CD"/>
-      </a:hlink>
-      <a:folHlink>
-        <a:srgbClr val="7890CD"/>
-      </a:folHlink>
-    </a:clrScheme>
-    <a:fontScheme name="Office">
-      <a:majorFont>
-        <a:latin typeface="Arial"/>
-        <a:ea typeface=""/>
-        <a:cs typeface=""/>
-        <a:font script="Jpan" typeface="ＭＳ Ｐゴシック"/>
-        <a:font script="Hang" typeface="맑은 고딕"/>
-        <a:font script="Hans" typeface="宋体"/>
-        <a:font script="Hant" typeface="新細明體"/>
-        <a:font script="Arab" typeface="Times New Roman"/>
-        <a:font script="Hebr" typeface="Times New Roman"/>
-        <a:font script="Thai" typeface="Angsana New"/>
-        <a:font script="Ethi" typeface="Nyala"/>
-        <a:font script="Beng" typeface="Vrinda"/>
-        <a:font script="Gujr" typeface="Shruti"/>
-        <a:font script="Khmr" typeface="MoolBoran"/>
-        <a:font script="Knda" typeface="Tunga"/>
-        <a:font script="Guru" typeface="Raavi"/>
-        <a:font script="Cans" typeface="Euphemia"/>
-        <a:font script="Cher" typeface="Plantagenet Cherokee"/>
-        <a:font script="Yiii" typeface="Microsoft Yi Baiti"/>
-        <a:font script="Tibt" typeface="Microsoft Himalaya"/>
-        <a:font script="Thaa" typeface="MV Boli"/>
-        <a:font script="Deva" typeface="Mangal"/>
-        <a:font script="Telu" typeface="Gautami"/>
-        <a:font script="Taml" typeface="Latha"/>
-        <a:font script="Syrc" typeface="Estrangelo Edessa"/>
-        <a:font script="Orya" typeface="Kalinga"/>
-        <a:font script="Mlym" typeface="Kartika"/>
-        <a:font script="Laoo" typeface="DokChampa"/>
-        <a:font script="Sinh" typeface="Iskoola Pota"/>
-        <a:font script="Mong" typeface="Mongolian Baiti"/>
-        <a:font script="Viet" typeface="Times New Roman"/>
-        <a:font script="Uigh" typeface="Microsoft Uighur"/>
-        <a:font script="Geor" typeface="Sylfaen"/>
-      </a:majorFont>
-      <a:minorFont>
-        <a:latin typeface="Arial"/>
-        <a:ea typeface=""/>
-        <a:cs typeface=""/>
-        <a:font script="Jpan" typeface="ＭＳ Ｐゴシック"/>
-        <a:font script="Hang" typeface="맑은 고딕"/>
-        <a:font script="Hans" typeface="宋体"/>
-        <a:font script="Hant" typeface="新細明體"/>
-        <a:font script="Arab" typeface="Arial"/>
-        <a:font script="Hebr" typeface="Arial"/>
-        <a:font script="Thai" typeface="Cordia New"/>
-        <a:font script="Ethi" typeface="Nyala"/>
-        <a:font script="Beng" typeface="Vrinda"/>
-        <a:font script="Gujr" typeface="Shruti"/>
-        <a:font script="Khmr" typeface="DaunPenh"/>
-        <a:font script="Knda" typeface="Tunga"/>
-        <a:font script="Guru" typeface="Raavi"/>
-        <a:font script="Cans" typeface="Euphemia"/>
-        <a:font script="Cher" typeface="Plantagenet Cherokee"/>
-        <a:font script="Yiii" typeface="Microsoft Yi Baiti"/>
-        <a:font script="Tibt" typeface="Microsoft Himalaya"/>
-        <a:font script="Thaa" typeface="MV Boli"/>
-        <a:font script="Deva" typeface="Mangal"/>
-        <a:font script="Telu" typeface="Gautami"/>
-        <a:font script="Taml" typeface="Latha"/>
-        <a:font script="Syrc" typeface="Estrangelo Edessa"/>
-        <a:font script="Orya" typeface="Kalinga"/>
-        <a:font script="Mlym" typeface="Kartika"/>
-        <a:font script="Laoo" typeface="DokChampa"/>
-        <a:font script="Sinh" typeface="Iskoola Pota"/>
-        <a:font script="Mong" typeface="Mongolian Baiti"/>
-        <a:font script="Viet" typeface="Arial"/>
-        <a:font script="Uigh" typeface="Microsoft Uighur"/>
-        <a:font script="Geor" typeface="Sylfaen"/>
-      </a:minorFont>
-    </a:fontScheme>
-    <a:fmtScheme name="Office">
-      <a:fillStyleLst>
-        <a:solidFill>
-          <a:schemeClr val="phClr"/>
-        </a:solidFill>
-        <a:gradFill rotWithShape="1">
-          <a:gsLst>
-            <a:gs pos="0">
-              <a:schemeClr val="phClr">
-                <a:tint val="50000"/>
-                <a:satMod val="300000"/>
-              </a:schemeClr>
-            </a:gs>
-            <a:gs pos="35000">
-              <a:schemeClr val="phClr">
-                <a:tint val="37000"/>
-                <a:satMod val="300000"/>
-              </a:schemeClr>
-            </a:gs>
-            <a:gs pos="100000">
-              <a:schemeClr val="phClr">
-                <a:tint val="15000"/>
-                <a:satMod val="350000"/>
-              </a:schemeClr>
-            </a:gs>
-          </a:gsLst>
-          <a:lin ang="16200000" scaled="1"/>
-        </a:gradFill>
-        <a:gradFill rotWithShape="1">
-          <a:gsLst>
-            <a:gs pos="0">
-              <a:schemeClr val="phClr">
-                <a:tint val="100000"/>
-                <a:shade val="100000"/>
-                <a:satMod val="130000"/>
-              </a:schemeClr>
-            </a:gs>
-            <a:gs pos="100000">
-              <a:schemeClr val="phClr">
-                <a:tint val="50000"/>
-                <a:shade val="100000"/>
-                <a:satMod val="350000"/>
-              </a:schemeClr>
-            </a:gs>
-          </a:gsLst>
-          <a:lin ang="16200000" scaled="0"/>
-        </a:gradFill>
-      </a:fillStyleLst>
-      <a:lnStyleLst>
-        <a:ln w="9525" cap="flat" cmpd="sng" algn="ctr">
-          <a:solidFill>
-            <a:schemeClr val="phClr">
-              <a:shade val="95000"/>
-              <a:satMod val="105000"/>
-            </a:schemeClr>
-          </a:solidFill>
-          <a:prstDash val="solid"/>
-        </a:ln>
-        <a:ln w="25400" cap="flat" cmpd="sng" algn="ctr">
-          <a:solidFill>
-            <a:schemeClr val="phClr"/>
-          </a:solidFill>
-          <a:prstDash val="solid"/>
-        </a:ln>
-        <a:ln w="38100" cap="flat" cmpd="sng" algn="ctr">
-          <a:solidFill>
-            <a:schemeClr val="phClr"/>
-          </a:solidFill>
-          <a:prstDash val="solid"/>
-        </a:ln>
-      </a:lnStyleLst>
-      <a:effectStyleLst>
-        <a:effectStyle>
-          <a:effectLst>
-            <a:outerShdw blurRad="40000" dist="20000" dir="5400000" rotWithShape="0">
-              <a:srgbClr val="000000">
-                <a:alpha val="38000"/>
-              </a:srgbClr>
-            </a:outerShdw>
-          </a:effectLst>
-        </a:effectStyle>
-        <a:effectStyle>
-          <a:effectLst>
-            <a:outerShdw blurRad="40000" dist="23000" dir="5400000" rotWithShape="0">
-              <a:srgbClr val="000000">
-                <a:alpha val="35000"/>
-              </a:srgbClr>
-            </a:outerShdw>
-          </a:effectLst>
-        </a:effectStyle>
-        <a:effectStyle>
-          <a:effectLst>
-            <a:outerShdw blurRad="40000" dist="23000" dir="5400000" rotWithShape="0">
-              <a:srgbClr val="000000">
-                <a:alpha val="35000"/>
-              </a:srgbClr>
-            </a:outerShdw>
-          </a:effectLst>
-          <a:scene3d>
-            <a:camera prst="orthographicFront">
-              <a:rot lat="0" lon="0" rev="0"/>
-            </a:camera>
-            <a:lightRig rig="threePt" dir="t">
-              <a:rot lat="0" lon="0" rev="1200000"/>
-            </a:lightRig>
-          </a:scene3d>
-          <a:sp3d>
-            <a:bevelT w="63500" h="25400"/>
-          </a:sp3d>
-        </a:effectStyle>
-      </a:effectStyleLst>
-      <a:bgFillStyleLst>
-        <a:solidFill>
-          <a:schemeClr val="phClr"/>
-        </a:solidFill>
-        <a:gradFill rotWithShape="1">
-          <a:gsLst>
-            <a:gs pos="0">
-              <a:schemeClr val="phClr">
-                <a:tint val="40000"/>
-                <a:satMod val="350000"/>
-              </a:schemeClr>
-            </a:gs>
-            <a:gs pos="40000">
-              <a:schemeClr val="phClr">
-                <a:tint val="45000"/>
-                <a:shade val="99000"/>
-                <a:satMod val="350000"/>
-              </a:schemeClr>
-            </a:gs>
-            <a:gs pos="100000">
-              <a:schemeClr val="phClr">
-                <a:shade val="20000"/>
-                <a:satMod val="255000"/>
-              </a:schemeClr>
-            </a:gs>
-          </a:gsLst>
-          <a:path path="circle">
-            <a:fillToRect l="50000" t="-80000" r="50000" b="180000"/>
-          </a:path>
-        </a:gradFill>
-        <a:gradFill rotWithShape="1">
-          <a:gsLst>
-            <a:gs pos="0">
-              <a:schemeClr val="phClr">
-                <a:tint val="80000"/>
-                <a:satMod val="300000"/>
-              </a:schemeClr>
-            </a:gs>
-            <a:gs pos="100000">
-              <a:schemeClr val="phClr">
-                <a:shade val="30000"/>
-                <a:satMod val="200000"/>
-              </a:schemeClr>
-            </a:gs>
-          </a:gsLst>
-          <a:path path="circle">
-            <a:fillToRect l="50000" t="50000" r="50000" b="50000"/>
-          </a:path>
-        </a:gradFill>
-      </a:bgFillStyleLst>
-    </a:fmtScheme>
-  </a:themeElements>
-</a:theme>
 </file>
</xml_diff>